<commit_message>
zip projekt og mere rapport
</commit_message>
<xml_diff>
--- a/rapport/images/tabledetect_flowchart.pptx
+++ b/rapport/images/tabledetect_flowchart.pptx
@@ -288,7 +288,7 @@
           <a:p>
             <a:fld id="{B14A1F59-A5BB-4789-B214-DB344DA8E5FB}" type="datetimeFigureOut">
               <a:rPr lang="da-DK" smtClean="0"/>
-              <a:t>17-03-2011</a:t>
+              <a:t>07-04-2011</a:t>
             </a:fld>
             <a:endParaRPr lang="da-DK"/>
           </a:p>
@@ -458,7 +458,7 @@
           <a:p>
             <a:fld id="{B14A1F59-A5BB-4789-B214-DB344DA8E5FB}" type="datetimeFigureOut">
               <a:rPr lang="da-DK" smtClean="0"/>
-              <a:t>17-03-2011</a:t>
+              <a:t>07-04-2011</a:t>
             </a:fld>
             <a:endParaRPr lang="da-DK"/>
           </a:p>
@@ -638,7 +638,7 @@
           <a:p>
             <a:fld id="{B14A1F59-A5BB-4789-B214-DB344DA8E5FB}" type="datetimeFigureOut">
               <a:rPr lang="da-DK" smtClean="0"/>
-              <a:t>17-03-2011</a:t>
+              <a:t>07-04-2011</a:t>
             </a:fld>
             <a:endParaRPr lang="da-DK"/>
           </a:p>
@@ -808,7 +808,7 @@
           <a:p>
             <a:fld id="{B14A1F59-A5BB-4789-B214-DB344DA8E5FB}" type="datetimeFigureOut">
               <a:rPr lang="da-DK" smtClean="0"/>
-              <a:t>17-03-2011</a:t>
+              <a:t>07-04-2011</a:t>
             </a:fld>
             <a:endParaRPr lang="da-DK"/>
           </a:p>
@@ -1054,7 +1054,7 @@
           <a:p>
             <a:fld id="{B14A1F59-A5BB-4789-B214-DB344DA8E5FB}" type="datetimeFigureOut">
               <a:rPr lang="da-DK" smtClean="0"/>
-              <a:t>17-03-2011</a:t>
+              <a:t>07-04-2011</a:t>
             </a:fld>
             <a:endParaRPr lang="da-DK"/>
           </a:p>
@@ -1342,7 +1342,7 @@
           <a:p>
             <a:fld id="{B14A1F59-A5BB-4789-B214-DB344DA8E5FB}" type="datetimeFigureOut">
               <a:rPr lang="da-DK" smtClean="0"/>
-              <a:t>17-03-2011</a:t>
+              <a:t>07-04-2011</a:t>
             </a:fld>
             <a:endParaRPr lang="da-DK"/>
           </a:p>
@@ -1764,7 +1764,7 @@
           <a:p>
             <a:fld id="{B14A1F59-A5BB-4789-B214-DB344DA8E5FB}" type="datetimeFigureOut">
               <a:rPr lang="da-DK" smtClean="0"/>
-              <a:t>17-03-2011</a:t>
+              <a:t>07-04-2011</a:t>
             </a:fld>
             <a:endParaRPr lang="da-DK"/>
           </a:p>
@@ -1882,7 +1882,7 @@
           <a:p>
             <a:fld id="{B14A1F59-A5BB-4789-B214-DB344DA8E5FB}" type="datetimeFigureOut">
               <a:rPr lang="da-DK" smtClean="0"/>
-              <a:t>17-03-2011</a:t>
+              <a:t>07-04-2011</a:t>
             </a:fld>
             <a:endParaRPr lang="da-DK"/>
           </a:p>
@@ -1977,7 +1977,7 @@
           <a:p>
             <a:fld id="{B14A1F59-A5BB-4789-B214-DB344DA8E5FB}" type="datetimeFigureOut">
               <a:rPr lang="da-DK" smtClean="0"/>
-              <a:t>17-03-2011</a:t>
+              <a:t>07-04-2011</a:t>
             </a:fld>
             <a:endParaRPr lang="da-DK"/>
           </a:p>
@@ -2254,7 +2254,7 @@
           <a:p>
             <a:fld id="{B14A1F59-A5BB-4789-B214-DB344DA8E5FB}" type="datetimeFigureOut">
               <a:rPr lang="da-DK" smtClean="0"/>
-              <a:t>17-03-2011</a:t>
+              <a:t>07-04-2011</a:t>
             </a:fld>
             <a:endParaRPr lang="da-DK"/>
           </a:p>
@@ -2507,7 +2507,7 @@
           <a:p>
             <a:fld id="{B14A1F59-A5BB-4789-B214-DB344DA8E5FB}" type="datetimeFigureOut">
               <a:rPr lang="da-DK" smtClean="0"/>
-              <a:t>17-03-2011</a:t>
+              <a:t>07-04-2011</a:t>
             </a:fld>
             <a:endParaRPr lang="da-DK"/>
           </a:p>
@@ -2720,7 +2720,7 @@
           <a:p>
             <a:fld id="{B14A1F59-A5BB-4789-B214-DB344DA8E5FB}" type="datetimeFigureOut">
               <a:rPr lang="da-DK" smtClean="0"/>
-              <a:t>17-03-2011</a:t>
+              <a:t>07-04-2011</a:t>
             </a:fld>
             <a:endParaRPr lang="da-DK"/>
           </a:p>
@@ -3140,7 +3140,7 @@
                   <a:schemeClr val="tx1"/>
                 </a:solidFill>
               </a:rPr>
-              <a:t>Make cloth white (255) and rest black (0)</a:t>
+              <a:t>Make binary by adaptive threshold</a:t>
             </a:r>
             <a:endParaRPr lang="da-DK" sz="1200" dirty="0">
               <a:solidFill>
@@ -3360,7 +3360,23 @@
                   <a:schemeClr val="tx1"/>
                 </a:solidFill>
               </a:rPr>
-              <a:t>Check if contours area is at least a fourth of the image</a:t>
+              <a:t>Check if contours area is at least </a:t>
+            </a:r>
+            <a:r>
+              <a:rPr lang="da-DK" sz="1200" dirty="0" smtClean="0">
+                <a:solidFill>
+                  <a:schemeClr val="tx1"/>
+                </a:solidFill>
+              </a:rPr>
+              <a:t>half of </a:t>
+            </a:r>
+            <a:r>
+              <a:rPr lang="da-DK" sz="1200" dirty="0" smtClean="0">
+                <a:solidFill>
+                  <a:schemeClr val="tx1"/>
+                </a:solidFill>
+              </a:rPr>
+              <a:t>the image</a:t>
             </a:r>
             <a:endParaRPr lang="da-DK" sz="1400" dirty="0">
               <a:solidFill>
@@ -3372,13 +3388,13 @@
       </p:sp>
       <p:sp>
         <p:nvSpPr>
-          <p:cNvPr id="10" name="Rounded Rectangle 9"/>
+          <p:cNvPr id="21" name="Rounded Rectangle 20"/>
           <p:cNvSpPr/>
           <p:nvPr/>
         </p:nvSpPr>
         <p:spPr>
           <a:xfrm>
-            <a:off x="2848426" y="2730888"/>
+            <a:off x="899592" y="5805264"/>
             <a:ext cx="1368152" cy="641830"/>
           </a:xfrm>
           <a:prstGeom prst="roundRect">
@@ -3415,7 +3431,7 @@
                   <a:schemeClr val="tx1"/>
                 </a:solidFill>
               </a:rPr>
-              <a:t>Go to next contour</a:t>
+              <a:t>Output ROI</a:t>
             </a:r>
             <a:endParaRPr lang="da-DK" sz="1200" dirty="0">
               <a:solidFill>
@@ -3425,96 +3441,45 @@
           </a:p>
         </p:txBody>
       </p:sp>
-      <p:cxnSp>
-        <p:nvCxnSpPr>
-          <p:cNvPr id="12" name="Elbow Connector 11"/>
-          <p:cNvCxnSpPr>
-            <a:stCxn id="8" idx="3"/>
-            <a:endCxn id="10" idx="2"/>
-          </p:cNvCxnSpPr>
+      <p:sp>
+        <p:nvSpPr>
+          <p:cNvPr id="33" name="TextBox 32"/>
+          <p:cNvSpPr txBox="1"/>
           <p:nvPr/>
-        </p:nvCxnSpPr>
+        </p:nvSpPr>
         <p:spPr>
-          <a:xfrm flipV="1">
-            <a:off x="2267744" y="3372718"/>
-            <a:ext cx="1264758" cy="305189"/>
+          <a:xfrm>
+            <a:off x="1531355" y="5372375"/>
+            <a:ext cx="455945" cy="276999"/>
           </a:xfrm>
-          <a:prstGeom prst="bentConnector2">
+          <a:prstGeom prst="rect">
             <a:avLst/>
           </a:prstGeom>
-          <a:ln w="12700">
-            <a:solidFill>
-              <a:srgbClr val="0070C0"/>
-            </a:solidFill>
-            <a:tailEnd type="arrow"/>
-          </a:ln>
+          <a:noFill/>
         </p:spPr>
-        <p:style>
-          <a:lnRef idx="1">
-            <a:schemeClr val="accent1"/>
-          </a:lnRef>
-          <a:fillRef idx="0">
-            <a:schemeClr val="accent1"/>
-          </a:fillRef>
-          <a:effectRef idx="0">
-            <a:schemeClr val="accent1"/>
-          </a:effectRef>
-          <a:fontRef idx="minor">
-            <a:schemeClr val="tx1"/>
-          </a:fontRef>
-        </p:style>
-      </p:cxnSp>
-      <p:cxnSp>
-        <p:nvCxnSpPr>
-          <p:cNvPr id="15" name="Elbow Connector 14"/>
-          <p:cNvCxnSpPr>
-            <a:stCxn id="10" idx="0"/>
-            <a:endCxn id="7" idx="3"/>
-          </p:cNvCxnSpPr>
-          <p:nvPr/>
-        </p:nvCxnSpPr>
-        <p:spPr>
-          <a:xfrm rot="16200000" flipH="1" flipV="1">
-            <a:off x="2822657" y="2175974"/>
-            <a:ext cx="154931" cy="1264758"/>
-          </a:xfrm>
-          <a:prstGeom prst="bentConnector4">
-            <a:avLst>
-              <a:gd name="adj1" fmla="val -147550"/>
-              <a:gd name="adj2" fmla="val 77044"/>
-            </a:avLst>
-          </a:prstGeom>
-          <a:ln w="12700">
-            <a:solidFill>
-              <a:srgbClr val="0070C0"/>
-            </a:solidFill>
-            <a:tailEnd type="arrow"/>
-          </a:ln>
-        </p:spPr>
-        <p:style>
-          <a:lnRef idx="1">
-            <a:schemeClr val="accent1"/>
-          </a:lnRef>
-          <a:fillRef idx="0">
-            <a:schemeClr val="accent1"/>
-          </a:fillRef>
-          <a:effectRef idx="0">
-            <a:schemeClr val="accent1"/>
-          </a:effectRef>
-          <a:fontRef idx="minor">
-            <a:schemeClr val="tx1"/>
-          </a:fontRef>
-        </p:style>
-      </p:cxnSp>
-      <p:sp>
-        <p:nvSpPr>
-          <p:cNvPr id="21" name="Rounded Rectangle 20"/>
+        <p:txBody>
+          <a:bodyPr wrap="square" rtlCol="0">
+            <a:spAutoFit/>
+          </a:bodyPr>
+          <a:lstStyle/>
+          <a:p>
+            <a:r>
+              <a:rPr lang="da-DK" sz="1200" dirty="0" smtClean="0"/>
+              <a:t>Yes</a:t>
+            </a:r>
+            <a:endParaRPr lang="da-DK" sz="1200" dirty="0"/>
+          </a:p>
+        </p:txBody>
+      </p:sp>
+      <p:sp>
+        <p:nvSpPr>
+          <p:cNvPr id="38" name="Rounded Rectangle 37"/>
           <p:cNvSpPr/>
           <p:nvPr/>
         </p:nvSpPr>
         <p:spPr>
           <a:xfrm>
-            <a:off x="3128231" y="4550906"/>
+            <a:off x="2596832" y="3939048"/>
             <a:ext cx="1368152" cy="641830"/>
           </a:xfrm>
           <a:prstGeom prst="roundRect">
@@ -3551,7 +3516,7 @@
                   <a:schemeClr val="tx1"/>
                 </a:solidFill>
               </a:rPr>
-              <a:t>Output ROI</a:t>
+              <a:t>Output failure (no detected table)</a:t>
             </a:r>
             <a:endParaRPr lang="da-DK" sz="1200" dirty="0">
               <a:solidFill>
@@ -3561,169 +3526,6 @@
           </a:p>
         </p:txBody>
       </p:sp>
-      <p:cxnSp>
-        <p:nvCxnSpPr>
-          <p:cNvPr id="32" name="Straight Arrow Connector 31"/>
-          <p:cNvCxnSpPr>
-            <a:stCxn id="9" idx="3"/>
-            <a:endCxn id="21" idx="1"/>
-          </p:cNvCxnSpPr>
-          <p:nvPr/>
-        </p:nvCxnSpPr>
-        <p:spPr>
-          <a:xfrm>
-            <a:off x="2267744" y="4871821"/>
-            <a:ext cx="860487" cy="0"/>
-          </a:xfrm>
-          <a:prstGeom prst="straightConnector1">
-            <a:avLst/>
-          </a:prstGeom>
-          <a:ln w="12700">
-            <a:solidFill>
-              <a:srgbClr val="0070C0"/>
-            </a:solidFill>
-            <a:tailEnd type="arrow"/>
-          </a:ln>
-        </p:spPr>
-        <p:style>
-          <a:lnRef idx="1">
-            <a:schemeClr val="accent1"/>
-          </a:lnRef>
-          <a:fillRef idx="0">
-            <a:schemeClr val="accent1"/>
-          </a:fillRef>
-          <a:effectRef idx="0">
-            <a:schemeClr val="accent1"/>
-          </a:effectRef>
-          <a:fontRef idx="minor">
-            <a:schemeClr val="tx1"/>
-          </a:fontRef>
-        </p:style>
-      </p:cxnSp>
-      <p:sp>
-        <p:nvSpPr>
-          <p:cNvPr id="33" name="TextBox 32"/>
-          <p:cNvSpPr txBox="1"/>
-          <p:nvPr/>
-        </p:nvSpPr>
-        <p:spPr>
-          <a:xfrm>
-            <a:off x="2481795" y="4653136"/>
-            <a:ext cx="455945" cy="276999"/>
-          </a:xfrm>
-          <a:prstGeom prst="rect">
-            <a:avLst/>
-          </a:prstGeom>
-          <a:noFill/>
-        </p:spPr>
-        <p:txBody>
-          <a:bodyPr wrap="square" rtlCol="0">
-            <a:spAutoFit/>
-          </a:bodyPr>
-          <a:lstStyle/>
-          <a:p>
-            <a:r>
-              <a:rPr lang="da-DK" sz="1200" dirty="0" smtClean="0"/>
-              <a:t>Yes</a:t>
-            </a:r>
-            <a:endParaRPr lang="da-DK" sz="1200" dirty="0"/>
-          </a:p>
-        </p:txBody>
-      </p:sp>
-      <p:sp>
-        <p:nvSpPr>
-          <p:cNvPr id="38" name="Rounded Rectangle 37"/>
-          <p:cNvSpPr/>
-          <p:nvPr/>
-        </p:nvSpPr>
-        <p:spPr>
-          <a:xfrm>
-            <a:off x="3131840" y="5343166"/>
-            <a:ext cx="1368152" cy="641830"/>
-          </a:xfrm>
-          <a:prstGeom prst="roundRect">
-            <a:avLst/>
-          </a:prstGeom>
-          <a:solidFill>
-            <a:schemeClr val="bg1"/>
-          </a:solidFill>
-        </p:spPr>
-        <p:style>
-          <a:lnRef idx="2">
-            <a:schemeClr val="accent1">
-              <a:shade val="50000"/>
-            </a:schemeClr>
-          </a:lnRef>
-          <a:fillRef idx="1">
-            <a:schemeClr val="accent1"/>
-          </a:fillRef>
-          <a:effectRef idx="0">
-            <a:schemeClr val="accent1"/>
-          </a:effectRef>
-          <a:fontRef idx="minor">
-            <a:schemeClr val="lt1"/>
-          </a:fontRef>
-        </p:style>
-        <p:txBody>
-          <a:bodyPr rtlCol="0" anchor="ctr"/>
-          <a:lstStyle/>
-          <a:p>
-            <a:pPr algn="ctr"/>
-            <a:r>
-              <a:rPr lang="da-DK" sz="1200" dirty="0" smtClean="0">
-                <a:solidFill>
-                  <a:schemeClr val="tx1"/>
-                </a:solidFill>
-              </a:rPr>
-              <a:t>Output failure (no detected table)</a:t>
-            </a:r>
-            <a:endParaRPr lang="da-DK" sz="1200" dirty="0">
-              <a:solidFill>
-                <a:schemeClr val="tx1"/>
-              </a:solidFill>
-            </a:endParaRPr>
-          </a:p>
-        </p:txBody>
-      </p:sp>
-      <p:cxnSp>
-        <p:nvCxnSpPr>
-          <p:cNvPr id="40" name="Elbow Connector 39"/>
-          <p:cNvCxnSpPr>
-            <a:stCxn id="9" idx="2"/>
-            <a:endCxn id="38" idx="1"/>
-          </p:cNvCxnSpPr>
-          <p:nvPr/>
-        </p:nvCxnSpPr>
-        <p:spPr>
-          <a:xfrm rot="16200000" flipH="1">
-            <a:off x="2140314" y="4672554"/>
-            <a:ext cx="434881" cy="1548172"/>
-          </a:xfrm>
-          <a:prstGeom prst="bentConnector2">
-            <a:avLst/>
-          </a:prstGeom>
-          <a:ln w="12700">
-            <a:solidFill>
-              <a:srgbClr val="0070C0"/>
-            </a:solidFill>
-            <a:tailEnd type="arrow"/>
-          </a:ln>
-        </p:spPr>
-        <p:style>
-          <a:lnRef idx="1">
-            <a:schemeClr val="accent1"/>
-          </a:lnRef>
-          <a:fillRef idx="0">
-            <a:schemeClr val="accent1"/>
-          </a:fillRef>
-          <a:effectRef idx="0">
-            <a:schemeClr val="accent1"/>
-          </a:effectRef>
-          <a:fontRef idx="minor">
-            <a:schemeClr val="tx1"/>
-          </a:fontRef>
-        </p:style>
-      </p:cxnSp>
       <p:sp>
         <p:nvSpPr>
           <p:cNvPr id="43" name="TextBox 42"/>
@@ -3732,7 +3534,7 @@
         </p:nvSpPr>
         <p:spPr>
           <a:xfrm>
-            <a:off x="2118676" y="5434348"/>
+            <a:off x="2426176" y="4627587"/>
             <a:ext cx="478156" cy="276999"/>
           </a:xfrm>
           <a:prstGeom prst="rect">
@@ -3936,7 +3738,7 @@
         </p:nvSpPr>
         <p:spPr>
           <a:xfrm>
-            <a:off x="1547701" y="4121464"/>
+            <a:off x="1517329" y="4121464"/>
             <a:ext cx="483996" cy="276999"/>
           </a:xfrm>
           <a:prstGeom prst="rect">
@@ -3958,16 +3760,88 @@
           </a:p>
         </p:txBody>
       </p:sp>
-      <p:sp>
-        <p:nvSpPr>
-          <p:cNvPr id="57" name="TextBox 56"/>
+      <p:cxnSp>
+        <p:nvCxnSpPr>
+          <p:cNvPr id="11" name="Elbow Connector 10"/>
+          <p:cNvCxnSpPr>
+            <a:stCxn id="9" idx="3"/>
+            <a:endCxn id="38" idx="1"/>
+          </p:cNvCxnSpPr>
+          <p:nvPr/>
+        </p:nvCxnSpPr>
+        <p:spPr>
+          <a:xfrm flipV="1">
+            <a:off x="2267744" y="4259963"/>
+            <a:ext cx="329088" cy="611858"/>
+          </a:xfrm>
+          <a:prstGeom prst="bentConnector3">
+            <a:avLst/>
+          </a:prstGeom>
+          <a:ln>
+            <a:tailEnd type="arrow"/>
+          </a:ln>
+        </p:spPr>
+        <p:style>
+          <a:lnRef idx="1">
+            <a:schemeClr val="accent1"/>
+          </a:lnRef>
+          <a:fillRef idx="0">
+            <a:schemeClr val="accent1"/>
+          </a:fillRef>
+          <a:effectRef idx="0">
+            <a:schemeClr val="accent1"/>
+          </a:effectRef>
+          <a:fontRef idx="minor">
+            <a:schemeClr val="tx1"/>
+          </a:fontRef>
+        </p:style>
+      </p:cxnSp>
+      <p:cxnSp>
+        <p:nvCxnSpPr>
+          <p:cNvPr id="14" name="Elbow Connector 13"/>
+          <p:cNvCxnSpPr>
+            <a:stCxn id="8" idx="3"/>
+            <a:endCxn id="38" idx="1"/>
+          </p:cNvCxnSpPr>
+          <p:nvPr/>
+        </p:nvCxnSpPr>
+        <p:spPr>
+          <a:xfrm>
+            <a:off x="2267744" y="3677907"/>
+            <a:ext cx="329088" cy="582056"/>
+          </a:xfrm>
+          <a:prstGeom prst="bentConnector3">
+            <a:avLst/>
+          </a:prstGeom>
+          <a:ln>
+            <a:tailEnd type="arrow"/>
+          </a:ln>
+        </p:spPr>
+        <p:style>
+          <a:lnRef idx="1">
+            <a:schemeClr val="accent1"/>
+          </a:lnRef>
+          <a:fillRef idx="0">
+            <a:schemeClr val="accent1"/>
+          </a:fillRef>
+          <a:effectRef idx="0">
+            <a:schemeClr val="accent1"/>
+          </a:effectRef>
+          <a:fontRef idx="minor">
+            <a:schemeClr val="tx1"/>
+          </a:fontRef>
+        </p:style>
+      </p:cxnSp>
+      <p:sp>
+        <p:nvSpPr>
+          <p:cNvPr id="29" name="TextBox 28"/>
           <p:cNvSpPr txBox="1"/>
           <p:nvPr/>
         </p:nvSpPr>
         <p:spPr>
           <a:xfrm>
-            <a:off x="2596832" y="3666601"/>
-            <a:ext cx="398927" cy="276999"/>
+            <a:off x="2432288" y="3662049"/>
+            <a:ext cx="478156" cy="276999"/>
           </a:xfrm>
           <a:prstGeom prst="rect">
             <a:avLst/>
@@ -3988,6 +3862,42 @@
           </a:p>
         </p:txBody>
       </p:sp>
+      <p:cxnSp>
+        <p:nvCxnSpPr>
+          <p:cNvPr id="17" name="Straight Arrow Connector 16"/>
+          <p:cNvCxnSpPr>
+            <a:stCxn id="9" idx="2"/>
+            <a:endCxn id="21" idx="0"/>
+          </p:cNvCxnSpPr>
+          <p:nvPr/>
+        </p:nvCxnSpPr>
+        <p:spPr>
+          <a:xfrm>
+            <a:off x="1583668" y="5229200"/>
+            <a:ext cx="0" cy="576064"/>
+          </a:xfrm>
+          <a:prstGeom prst="straightConnector1">
+            <a:avLst/>
+          </a:prstGeom>
+          <a:ln>
+            <a:tailEnd type="arrow"/>
+          </a:ln>
+        </p:spPr>
+        <p:style>
+          <a:lnRef idx="1">
+            <a:schemeClr val="accent1"/>
+          </a:lnRef>
+          <a:fillRef idx="0">
+            <a:schemeClr val="accent1"/>
+          </a:fillRef>
+          <a:effectRef idx="0">
+            <a:schemeClr val="accent1"/>
+          </a:effectRef>
+          <a:fontRef idx="minor">
+            <a:schemeClr val="tx1"/>
+          </a:fontRef>
+        </p:style>
+      </p:cxnSp>
     </p:spTree>
     <p:extLst>
       <p:ext uri="{BB962C8B-B14F-4D97-AF65-F5344CB8AC3E}">

</xml_diff>

<commit_message>
new section on table finding -> method 2.0
</commit_message>
<xml_diff>
--- a/rapport/images/tabledetect_flowchart.pptx
+++ b/rapport/images/tabledetect_flowchart.pptx
@@ -288,7 +288,7 @@
           <a:p>
             <a:fld id="{B14A1F59-A5BB-4789-B214-DB344DA8E5FB}" type="datetimeFigureOut">
               <a:rPr lang="da-DK" smtClean="0"/>
-              <a:t>07-04-2011</a:t>
+              <a:t>25-04-2011</a:t>
             </a:fld>
             <a:endParaRPr lang="da-DK"/>
           </a:p>
@@ -458,7 +458,7 @@
           <a:p>
             <a:fld id="{B14A1F59-A5BB-4789-B214-DB344DA8E5FB}" type="datetimeFigureOut">
               <a:rPr lang="da-DK" smtClean="0"/>
-              <a:t>07-04-2011</a:t>
+              <a:t>25-04-2011</a:t>
             </a:fld>
             <a:endParaRPr lang="da-DK"/>
           </a:p>
@@ -638,7 +638,7 @@
           <a:p>
             <a:fld id="{B14A1F59-A5BB-4789-B214-DB344DA8E5FB}" type="datetimeFigureOut">
               <a:rPr lang="da-DK" smtClean="0"/>
-              <a:t>07-04-2011</a:t>
+              <a:t>25-04-2011</a:t>
             </a:fld>
             <a:endParaRPr lang="da-DK"/>
           </a:p>
@@ -808,7 +808,7 @@
           <a:p>
             <a:fld id="{B14A1F59-A5BB-4789-B214-DB344DA8E5FB}" type="datetimeFigureOut">
               <a:rPr lang="da-DK" smtClean="0"/>
-              <a:t>07-04-2011</a:t>
+              <a:t>25-04-2011</a:t>
             </a:fld>
             <a:endParaRPr lang="da-DK"/>
           </a:p>
@@ -1054,7 +1054,7 @@
           <a:p>
             <a:fld id="{B14A1F59-A5BB-4789-B214-DB344DA8E5FB}" type="datetimeFigureOut">
               <a:rPr lang="da-DK" smtClean="0"/>
-              <a:t>07-04-2011</a:t>
+              <a:t>25-04-2011</a:t>
             </a:fld>
             <a:endParaRPr lang="da-DK"/>
           </a:p>
@@ -1342,7 +1342,7 @@
           <a:p>
             <a:fld id="{B14A1F59-A5BB-4789-B214-DB344DA8E5FB}" type="datetimeFigureOut">
               <a:rPr lang="da-DK" smtClean="0"/>
-              <a:t>07-04-2011</a:t>
+              <a:t>25-04-2011</a:t>
             </a:fld>
             <a:endParaRPr lang="da-DK"/>
           </a:p>
@@ -1764,7 +1764,7 @@
           <a:p>
             <a:fld id="{B14A1F59-A5BB-4789-B214-DB344DA8E5FB}" type="datetimeFigureOut">
               <a:rPr lang="da-DK" smtClean="0"/>
-              <a:t>07-04-2011</a:t>
+              <a:t>25-04-2011</a:t>
             </a:fld>
             <a:endParaRPr lang="da-DK"/>
           </a:p>
@@ -1882,7 +1882,7 @@
           <a:p>
             <a:fld id="{B14A1F59-A5BB-4789-B214-DB344DA8E5FB}" type="datetimeFigureOut">
               <a:rPr lang="da-DK" smtClean="0"/>
-              <a:t>07-04-2011</a:t>
+              <a:t>25-04-2011</a:t>
             </a:fld>
             <a:endParaRPr lang="da-DK"/>
           </a:p>
@@ -1977,7 +1977,7 @@
           <a:p>
             <a:fld id="{B14A1F59-A5BB-4789-B214-DB344DA8E5FB}" type="datetimeFigureOut">
               <a:rPr lang="da-DK" smtClean="0"/>
-              <a:t>07-04-2011</a:t>
+              <a:t>25-04-2011</a:t>
             </a:fld>
             <a:endParaRPr lang="da-DK"/>
           </a:p>
@@ -2254,7 +2254,7 @@
           <a:p>
             <a:fld id="{B14A1F59-A5BB-4789-B214-DB344DA8E5FB}" type="datetimeFigureOut">
               <a:rPr lang="da-DK" smtClean="0"/>
-              <a:t>07-04-2011</a:t>
+              <a:t>25-04-2011</a:t>
             </a:fld>
             <a:endParaRPr lang="da-DK"/>
           </a:p>
@@ -2507,7 +2507,7 @@
           <a:p>
             <a:fld id="{B14A1F59-A5BB-4789-B214-DB344DA8E5FB}" type="datetimeFigureOut">
               <a:rPr lang="da-DK" smtClean="0"/>
-              <a:t>07-04-2011</a:t>
+              <a:t>25-04-2011</a:t>
             </a:fld>
             <a:endParaRPr lang="da-DK"/>
           </a:p>
@@ -2720,7 +2720,7 @@
           <a:p>
             <a:fld id="{B14A1F59-A5BB-4789-B214-DB344DA8E5FB}" type="datetimeFigureOut">
               <a:rPr lang="da-DK" smtClean="0"/>
-              <a:t>07-04-2011</a:t>
+              <a:t>25-04-2011</a:t>
             </a:fld>
             <a:endParaRPr lang="da-DK"/>
           </a:p>
@@ -3140,7 +3140,7 @@
                   <a:schemeClr val="tx1"/>
                 </a:solidFill>
               </a:rPr>
-              <a:t>Make binary by adaptive threshold</a:t>
+              <a:t>Convert to HSV and use the hue.</a:t>
             </a:r>
             <a:endParaRPr lang="da-DK" sz="1200" dirty="0">
               <a:solidFill>
@@ -3158,7 +3158,7 @@
         </p:nvSpPr>
         <p:spPr>
           <a:xfrm>
-            <a:off x="899592" y="1772816"/>
+            <a:off x="2432288" y="980728"/>
             <a:ext cx="1368152" cy="641830"/>
           </a:xfrm>
           <a:prstGeom prst="roundRect">
@@ -3195,7 +3195,7 @@
                   <a:schemeClr val="tx1"/>
                 </a:solidFill>
               </a:rPr>
-              <a:t>Smooth</a:t>
+              <a:t>Make histogram from hue image</a:t>
             </a:r>
             <a:endParaRPr lang="da-DK" sz="1400" dirty="0">
               <a:solidFill>
@@ -3213,7 +3213,62 @@
         </p:nvSpPr>
         <p:spPr>
           <a:xfrm>
-            <a:off x="899592" y="2564904"/>
+            <a:off x="3982124" y="943163"/>
+            <a:ext cx="1368152" cy="716959"/>
+          </a:xfrm>
+          <a:prstGeom prst="roundRect">
+            <a:avLst/>
+          </a:prstGeom>
+          <a:solidFill>
+            <a:schemeClr val="bg1"/>
+          </a:solidFill>
+        </p:spPr>
+        <p:style>
+          <a:lnRef idx="2">
+            <a:schemeClr val="accent1">
+              <a:shade val="50000"/>
+            </a:schemeClr>
+          </a:lnRef>
+          <a:fillRef idx="1">
+            <a:schemeClr val="accent1"/>
+          </a:fillRef>
+          <a:effectRef idx="0">
+            <a:schemeClr val="accent1"/>
+          </a:effectRef>
+          <a:fontRef idx="minor">
+            <a:schemeClr val="lt1"/>
+          </a:fontRef>
+        </p:style>
+        <p:txBody>
+          <a:bodyPr rtlCol="0" anchor="ctr"/>
+          <a:lstStyle/>
+          <a:p>
+            <a:pPr algn="ctr"/>
+            <a:r>
+              <a:rPr lang="da-DK" sz="1200" dirty="0" smtClean="0">
+                <a:solidFill>
+                  <a:schemeClr val="tx1"/>
+                </a:solidFill>
+              </a:rPr>
+              <a:t>Set pixels close to maximum hue value to 255, otherwise 0.</a:t>
+            </a:r>
+            <a:endParaRPr lang="da-DK" sz="1400" dirty="0">
+              <a:solidFill>
+                <a:schemeClr val="tx1"/>
+              </a:solidFill>
+            </a:endParaRPr>
+          </a:p>
+        </p:txBody>
+      </p:sp>
+      <p:sp>
+        <p:nvSpPr>
+          <p:cNvPr id="8" name="Rounded Rectangle 7"/>
+          <p:cNvSpPr/>
+          <p:nvPr/>
+        </p:nvSpPr>
+        <p:spPr>
+          <a:xfrm>
+            <a:off x="5547134" y="980728"/>
             <a:ext cx="1368152" cy="641830"/>
           </a:xfrm>
           <a:prstGeom prst="roundRect">
@@ -3250,7 +3305,7 @@
                   <a:schemeClr val="tx1"/>
                 </a:solidFill>
               </a:rPr>
-              <a:t>Find contours and sort by area</a:t>
+              <a:t>Use median filter to remove noise.</a:t>
             </a:r>
             <a:endParaRPr lang="da-DK" sz="1400" dirty="0">
               <a:solidFill>
@@ -3262,13 +3317,68 @@
       </p:sp>
       <p:sp>
         <p:nvSpPr>
-          <p:cNvPr id="8" name="Rounded Rectangle 7"/>
+          <p:cNvPr id="9" name="Rounded Rectangle 8"/>
           <p:cNvSpPr/>
           <p:nvPr/>
         </p:nvSpPr>
         <p:spPr>
           <a:xfrm>
-            <a:off x="899592" y="3356992"/>
+            <a:off x="7092280" y="945364"/>
+            <a:ext cx="1368152" cy="714758"/>
+          </a:xfrm>
+          <a:prstGeom prst="roundRect">
+            <a:avLst/>
+          </a:prstGeom>
+          <a:solidFill>
+            <a:schemeClr val="bg1"/>
+          </a:solidFill>
+        </p:spPr>
+        <p:style>
+          <a:lnRef idx="2">
+            <a:schemeClr val="accent1">
+              <a:shade val="50000"/>
+            </a:schemeClr>
+          </a:lnRef>
+          <a:fillRef idx="1">
+            <a:schemeClr val="accent1"/>
+          </a:fillRef>
+          <a:effectRef idx="0">
+            <a:schemeClr val="accent1"/>
+          </a:effectRef>
+          <a:fontRef idx="minor">
+            <a:schemeClr val="lt1"/>
+          </a:fontRef>
+        </p:style>
+        <p:txBody>
+          <a:bodyPr rtlCol="0" anchor="ctr"/>
+          <a:lstStyle/>
+          <a:p>
+            <a:pPr algn="ctr"/>
+            <a:r>
+              <a:rPr lang="da-DK" sz="1200" dirty="0" smtClean="0">
+                <a:solidFill>
+                  <a:schemeClr val="tx1"/>
+                </a:solidFill>
+              </a:rPr>
+              <a:t>Detect bounding box of cloth.</a:t>
+            </a:r>
+            <a:endParaRPr lang="da-DK" sz="1400" dirty="0">
+              <a:solidFill>
+                <a:schemeClr val="tx1"/>
+              </a:solidFill>
+            </a:endParaRPr>
+          </a:p>
+        </p:txBody>
+      </p:sp>
+      <p:sp>
+        <p:nvSpPr>
+          <p:cNvPr id="21" name="Rounded Rectangle 20"/>
+          <p:cNvSpPr/>
+          <p:nvPr/>
+        </p:nvSpPr>
+        <p:spPr>
+          <a:xfrm>
+            <a:off x="7092281" y="3429000"/>
             <a:ext cx="1368152" cy="641830"/>
           </a:xfrm>
           <a:prstGeom prst="roundRect">
@@ -3305,80 +3415,17 @@
                   <a:schemeClr val="tx1"/>
                 </a:solidFill>
               </a:rPr>
-              <a:t>Check if contour is a rectangle</a:t>
-            </a:r>
-            <a:endParaRPr lang="da-DK" sz="1400" dirty="0">
-              <a:solidFill>
-                <a:schemeClr val="tx1"/>
-              </a:solidFill>
-            </a:endParaRPr>
-          </a:p>
-        </p:txBody>
-      </p:sp>
-      <p:sp>
-        <p:nvSpPr>
-          <p:cNvPr id="9" name="Rounded Rectangle 8"/>
-          <p:cNvSpPr/>
-          <p:nvPr/>
-        </p:nvSpPr>
-        <p:spPr>
-          <a:xfrm>
-            <a:off x="899592" y="4514442"/>
-            <a:ext cx="1368152" cy="714758"/>
-          </a:xfrm>
-          <a:prstGeom prst="roundRect">
-            <a:avLst/>
-          </a:prstGeom>
-          <a:solidFill>
-            <a:schemeClr val="bg1"/>
-          </a:solidFill>
-        </p:spPr>
-        <p:style>
-          <a:lnRef idx="2">
-            <a:schemeClr val="accent1">
-              <a:shade val="50000"/>
-            </a:schemeClr>
-          </a:lnRef>
-          <a:fillRef idx="1">
-            <a:schemeClr val="accent1"/>
-          </a:fillRef>
-          <a:effectRef idx="0">
-            <a:schemeClr val="accent1"/>
-          </a:effectRef>
-          <a:fontRef idx="minor">
-            <a:schemeClr val="lt1"/>
-          </a:fontRef>
-        </p:style>
-        <p:txBody>
-          <a:bodyPr rtlCol="0" anchor="ctr"/>
-          <a:lstStyle/>
-          <a:p>
-            <a:pPr algn="ctr"/>
+              <a:t>Output angle and </a:t>
+            </a:r>
             <a:r>
               <a:rPr lang="da-DK" sz="1200" dirty="0" smtClean="0">
                 <a:solidFill>
                   <a:schemeClr val="tx1"/>
                 </a:solidFill>
               </a:rPr>
-              <a:t>Check if contours area is at least </a:t>
-            </a:r>
-            <a:r>
-              <a:rPr lang="da-DK" sz="1200" dirty="0" smtClean="0">
-                <a:solidFill>
-                  <a:schemeClr val="tx1"/>
-                </a:solidFill>
-              </a:rPr>
-              <a:t>half of </a:t>
-            </a:r>
-            <a:r>
-              <a:rPr lang="da-DK" sz="1200" dirty="0" smtClean="0">
-                <a:solidFill>
-                  <a:schemeClr val="tx1"/>
-                </a:solidFill>
-              </a:rPr>
-              <a:t>the image</a:t>
-            </a:r>
-            <a:endParaRPr lang="da-DK" sz="1400" dirty="0">
+              <a:t>ROI</a:t>
+            </a:r>
+            <a:endParaRPr lang="da-DK" sz="1200" dirty="0">
               <a:solidFill>
                 <a:schemeClr val="tx1"/>
               </a:solidFill>
@@ -3388,13 +3435,13 @@
       </p:sp>
       <p:sp>
         <p:nvSpPr>
-          <p:cNvPr id="21" name="Rounded Rectangle 20"/>
+          <p:cNvPr id="38" name="Rounded Rectangle 37"/>
           <p:cNvSpPr/>
           <p:nvPr/>
         </p:nvSpPr>
         <p:spPr>
           <a:xfrm>
-            <a:off x="899592" y="5805264"/>
+            <a:off x="4572000" y="2567583"/>
             <a:ext cx="1368152" cy="641830"/>
           </a:xfrm>
           <a:prstGeom prst="roundRect">
@@ -3431,128 +3478,37 @@
                   <a:schemeClr val="tx1"/>
                 </a:solidFill>
               </a:rPr>
-              <a:t>Output ROI</a:t>
+              <a:t>Output failure </a:t>
+            </a:r>
+            <a:r>
+              <a:rPr lang="da-DK" sz="1200" dirty="0" smtClean="0">
+                <a:solidFill>
+                  <a:schemeClr val="tx1"/>
+                </a:solidFill>
+              </a:rPr>
+              <a:t>(</a:t>
+            </a:r>
+            <a:r>
+              <a:rPr lang="da-DK" sz="1200" dirty="0" smtClean="0">
+                <a:solidFill>
+                  <a:schemeClr val="tx1"/>
+                </a:solidFill>
+              </a:rPr>
+              <a:t>cloth not detected</a:t>
+            </a:r>
+            <a:r>
+              <a:rPr lang="da-DK" sz="1200" dirty="0" smtClean="0">
+                <a:solidFill>
+                  <a:schemeClr val="tx1"/>
+                </a:solidFill>
+              </a:rPr>
+              <a:t>)</a:t>
             </a:r>
             <a:endParaRPr lang="da-DK" sz="1200" dirty="0">
               <a:solidFill>
                 <a:schemeClr val="tx1"/>
               </a:solidFill>
             </a:endParaRPr>
-          </a:p>
-        </p:txBody>
-      </p:sp>
-      <p:sp>
-        <p:nvSpPr>
-          <p:cNvPr id="33" name="TextBox 32"/>
-          <p:cNvSpPr txBox="1"/>
-          <p:nvPr/>
-        </p:nvSpPr>
-        <p:spPr>
-          <a:xfrm>
-            <a:off x="1531355" y="5372375"/>
-            <a:ext cx="455945" cy="276999"/>
-          </a:xfrm>
-          <a:prstGeom prst="rect">
-            <a:avLst/>
-          </a:prstGeom>
-          <a:noFill/>
-        </p:spPr>
-        <p:txBody>
-          <a:bodyPr wrap="square" rtlCol="0">
-            <a:spAutoFit/>
-          </a:bodyPr>
-          <a:lstStyle/>
-          <a:p>
-            <a:r>
-              <a:rPr lang="da-DK" sz="1200" dirty="0" smtClean="0"/>
-              <a:t>Yes</a:t>
-            </a:r>
-            <a:endParaRPr lang="da-DK" sz="1200" dirty="0"/>
-          </a:p>
-        </p:txBody>
-      </p:sp>
-      <p:sp>
-        <p:nvSpPr>
-          <p:cNvPr id="38" name="Rounded Rectangle 37"/>
-          <p:cNvSpPr/>
-          <p:nvPr/>
-        </p:nvSpPr>
-        <p:spPr>
-          <a:xfrm>
-            <a:off x="2596832" y="3939048"/>
-            <a:ext cx="1368152" cy="641830"/>
-          </a:xfrm>
-          <a:prstGeom prst="roundRect">
-            <a:avLst/>
-          </a:prstGeom>
-          <a:solidFill>
-            <a:schemeClr val="bg1"/>
-          </a:solidFill>
-        </p:spPr>
-        <p:style>
-          <a:lnRef idx="2">
-            <a:schemeClr val="accent1">
-              <a:shade val="50000"/>
-            </a:schemeClr>
-          </a:lnRef>
-          <a:fillRef idx="1">
-            <a:schemeClr val="accent1"/>
-          </a:fillRef>
-          <a:effectRef idx="0">
-            <a:schemeClr val="accent1"/>
-          </a:effectRef>
-          <a:fontRef idx="minor">
-            <a:schemeClr val="lt1"/>
-          </a:fontRef>
-        </p:style>
-        <p:txBody>
-          <a:bodyPr rtlCol="0" anchor="ctr"/>
-          <a:lstStyle/>
-          <a:p>
-            <a:pPr algn="ctr"/>
-            <a:r>
-              <a:rPr lang="da-DK" sz="1200" dirty="0" smtClean="0">
-                <a:solidFill>
-                  <a:schemeClr val="tx1"/>
-                </a:solidFill>
-              </a:rPr>
-              <a:t>Output failure (no detected table)</a:t>
-            </a:r>
-            <a:endParaRPr lang="da-DK" sz="1200" dirty="0">
-              <a:solidFill>
-                <a:schemeClr val="tx1"/>
-              </a:solidFill>
-            </a:endParaRPr>
-          </a:p>
-        </p:txBody>
-      </p:sp>
-      <p:sp>
-        <p:nvSpPr>
-          <p:cNvPr id="43" name="TextBox 42"/>
-          <p:cNvSpPr txBox="1"/>
-          <p:nvPr/>
-        </p:nvSpPr>
-        <p:spPr>
-          <a:xfrm>
-            <a:off x="2426176" y="4627587"/>
-            <a:ext cx="478156" cy="276999"/>
-          </a:xfrm>
-          <a:prstGeom prst="rect">
-            <a:avLst/>
-          </a:prstGeom>
-          <a:noFill/>
-        </p:spPr>
-        <p:txBody>
-          <a:bodyPr wrap="square" rtlCol="0">
-            <a:spAutoFit/>
-          </a:bodyPr>
-          <a:lstStyle/>
-          <a:p>
-            <a:r>
-              <a:rPr lang="da-DK" sz="1200" dirty="0" smtClean="0"/>
-              <a:t>No</a:t>
-            </a:r>
-            <a:endParaRPr lang="da-DK" sz="1200" dirty="0"/>
           </a:p>
         </p:txBody>
       </p:sp>
@@ -3596,22 +3552,24 @@
       </p:cxnSp>
       <p:cxnSp>
         <p:nvCxnSpPr>
-          <p:cNvPr id="47" name="Straight Connector 46"/>
+          <p:cNvPr id="36" name="Straight Arrow Connector 35"/>
           <p:cNvCxnSpPr>
-            <a:stCxn id="4" idx="2"/>
-            <a:endCxn id="5" idx="0"/>
+            <a:stCxn id="4" idx="3"/>
+            <a:endCxn id="5" idx="1"/>
           </p:cNvCxnSpPr>
           <p:nvPr/>
         </p:nvCxnSpPr>
         <p:spPr>
           <a:xfrm>
-            <a:off x="1583668" y="1622558"/>
-            <a:ext cx="0" cy="150258"/>
+            <a:off x="2267744" y="1301643"/>
+            <a:ext cx="164544" cy="0"/>
           </a:xfrm>
-          <a:prstGeom prst="line">
+          <a:prstGeom prst="straightConnector1">
             <a:avLst/>
           </a:prstGeom>
-          <a:ln w="12700"/>
+          <a:ln>
+            <a:tailEnd type="arrow"/>
+          </a:ln>
         </p:spPr>
         <p:style>
           <a:lnRef idx="1">
@@ -3630,22 +3588,24 @@
       </p:cxnSp>
       <p:cxnSp>
         <p:nvCxnSpPr>
-          <p:cNvPr id="49" name="Straight Connector 48"/>
+          <p:cNvPr id="39" name="Straight Arrow Connector 38"/>
           <p:cNvCxnSpPr>
-            <a:stCxn id="5" idx="2"/>
-            <a:endCxn id="7" idx="0"/>
+            <a:stCxn id="5" idx="3"/>
+            <a:endCxn id="7" idx="1"/>
           </p:cNvCxnSpPr>
           <p:nvPr/>
         </p:nvCxnSpPr>
         <p:spPr>
           <a:xfrm>
-            <a:off x="1583668" y="2414646"/>
-            <a:ext cx="0" cy="150258"/>
+            <a:off x="3800440" y="1301643"/>
+            <a:ext cx="181684" cy="0"/>
           </a:xfrm>
-          <a:prstGeom prst="line">
+          <a:prstGeom prst="straightConnector1">
             <a:avLst/>
           </a:prstGeom>
-          <a:ln w="12700"/>
+          <a:ln>
+            <a:tailEnd type="arrow"/>
+          </a:ln>
         </p:spPr>
         <p:style>
           <a:lnRef idx="1">
@@ -3664,22 +3624,24 @@
       </p:cxnSp>
       <p:cxnSp>
         <p:nvCxnSpPr>
-          <p:cNvPr id="51" name="Straight Connector 50"/>
+          <p:cNvPr id="41" name="Straight Arrow Connector 40"/>
           <p:cNvCxnSpPr>
-            <a:stCxn id="7" idx="2"/>
-            <a:endCxn id="8" idx="0"/>
+            <a:stCxn id="7" idx="3"/>
+            <a:endCxn id="8" idx="1"/>
           </p:cNvCxnSpPr>
           <p:nvPr/>
         </p:nvCxnSpPr>
         <p:spPr>
           <a:xfrm>
-            <a:off x="1583668" y="3206734"/>
-            <a:ext cx="0" cy="150258"/>
+            <a:off x="5350276" y="1301643"/>
+            <a:ext cx="196858" cy="0"/>
           </a:xfrm>
-          <a:prstGeom prst="line">
+          <a:prstGeom prst="straightConnector1">
             <a:avLst/>
           </a:prstGeom>
-          <a:ln w="12700"/>
+          <a:ln>
+            <a:tailEnd type="arrow"/>
+          </a:ln>
         </p:spPr>
         <p:style>
           <a:lnRef idx="1">
@@ -3698,22 +3660,24 @@
       </p:cxnSp>
       <p:cxnSp>
         <p:nvCxnSpPr>
-          <p:cNvPr id="53" name="Straight Connector 52"/>
+          <p:cNvPr id="55" name="Straight Arrow Connector 54"/>
           <p:cNvCxnSpPr>
-            <a:stCxn id="8" idx="2"/>
-            <a:endCxn id="9" idx="0"/>
+            <a:stCxn id="8" idx="3"/>
+            <a:endCxn id="9" idx="1"/>
           </p:cNvCxnSpPr>
           <p:nvPr/>
         </p:nvCxnSpPr>
         <p:spPr>
           <a:xfrm>
-            <a:off x="1583668" y="3998822"/>
-            <a:ext cx="0" cy="515620"/>
+            <a:off x="6915286" y="1301643"/>
+            <a:ext cx="176994" cy="1100"/>
           </a:xfrm>
-          <a:prstGeom prst="line">
+          <a:prstGeom prst="straightConnector1">
             <a:avLst/>
           </a:prstGeom>
-          <a:ln w="12700"/>
+          <a:ln>
+            <a:tailEnd type="arrow"/>
+          </a:ln>
         </p:spPr>
         <p:style>
           <a:lnRef idx="1">
@@ -3732,47 +3696,72 @@
       </p:cxnSp>
       <p:sp>
         <p:nvSpPr>
-          <p:cNvPr id="56" name="TextBox 55"/>
-          <p:cNvSpPr txBox="1"/>
+          <p:cNvPr id="64" name="Rounded Rectangle 63"/>
+          <p:cNvSpPr/>
           <p:nvPr/>
         </p:nvSpPr>
         <p:spPr>
           <a:xfrm>
-            <a:off x="1517329" y="4121464"/>
-            <a:ext cx="483996" cy="276999"/>
+            <a:off x="7092230" y="2564904"/>
+            <a:ext cx="1368152" cy="641830"/>
           </a:xfrm>
-          <a:prstGeom prst="rect">
+          <a:prstGeom prst="roundRect">
             <a:avLst/>
           </a:prstGeom>
-          <a:noFill/>
+          <a:solidFill>
+            <a:schemeClr val="bg1"/>
+          </a:solidFill>
         </p:spPr>
-        <p:txBody>
-          <a:bodyPr wrap="square" rtlCol="0">
-            <a:spAutoFit/>
-          </a:bodyPr>
-          <a:lstStyle/>
-          <a:p>
-            <a:r>
-              <a:rPr lang="da-DK" sz="1200" dirty="0" smtClean="0"/>
-              <a:t>Yes</a:t>
-            </a:r>
-            <a:endParaRPr lang="da-DK" sz="1200" dirty="0"/>
+        <p:style>
+          <a:lnRef idx="2">
+            <a:schemeClr val="accent1">
+              <a:shade val="50000"/>
+            </a:schemeClr>
+          </a:lnRef>
+          <a:fillRef idx="1">
+            <a:schemeClr val="accent1"/>
+          </a:fillRef>
+          <a:effectRef idx="0">
+            <a:schemeClr val="accent1"/>
+          </a:effectRef>
+          <a:fontRef idx="minor">
+            <a:schemeClr val="lt1"/>
+          </a:fontRef>
+        </p:style>
+        <p:txBody>
+          <a:bodyPr rtlCol="0" anchor="ctr"/>
+          <a:lstStyle/>
+          <a:p>
+            <a:pPr algn="ctr"/>
+            <a:r>
+              <a:rPr lang="da-DK" sz="1200" dirty="0" smtClean="0">
+                <a:solidFill>
+                  <a:schemeClr val="tx1"/>
+                </a:solidFill>
+              </a:rPr>
+              <a:t>Find angle of the cloth.</a:t>
+            </a:r>
+            <a:endParaRPr lang="da-DK" sz="1200" dirty="0">
+              <a:solidFill>
+                <a:schemeClr val="tx1"/>
+              </a:solidFill>
+            </a:endParaRPr>
           </a:p>
         </p:txBody>
       </p:sp>
       <p:cxnSp>
         <p:nvCxnSpPr>
-          <p:cNvPr id="11" name="Elbow Connector 10"/>
+          <p:cNvPr id="70" name="Elbow Connector 69"/>
           <p:cNvCxnSpPr>
-            <a:stCxn id="9" idx="3"/>
-            <a:endCxn id="38" idx="1"/>
+            <a:stCxn id="9" idx="2"/>
+            <a:endCxn id="38" idx="0"/>
           </p:cNvCxnSpPr>
           <p:nvPr/>
         </p:nvCxnSpPr>
         <p:spPr>
-          <a:xfrm flipV="1">
-            <a:off x="2267744" y="4259963"/>
-            <a:ext cx="329088" cy="611858"/>
+          <a:xfrm rot="5400000">
+            <a:off x="6062486" y="853712"/>
+            <a:ext cx="907461" cy="2520280"/>
           </a:xfrm>
           <a:prstGeom prst="bentConnector3">
             <a:avLst/>
@@ -3796,67 +3785,59 @@
           </a:fontRef>
         </p:style>
       </p:cxnSp>
-      <p:cxnSp>
-        <p:nvCxnSpPr>
-          <p:cNvPr id="14" name="Elbow Connector 13"/>
-          <p:cNvCxnSpPr>
-            <a:stCxn id="8" idx="3"/>
-            <a:endCxn id="38" idx="1"/>
-          </p:cNvCxnSpPr>
+      <p:sp>
+        <p:nvSpPr>
+          <p:cNvPr id="74" name="Rectangle 73"/>
+          <p:cNvSpPr/>
           <p:nvPr/>
-        </p:nvCxnSpPr>
+        </p:nvSpPr>
         <p:spPr>
           <a:xfrm>
-            <a:off x="2267744" y="3677907"/>
-            <a:ext cx="329088" cy="582056"/>
-          </a:xfrm>
-          <a:prstGeom prst="bentConnector3">
-            <a:avLst/>
-          </a:prstGeom>
-          <a:ln>
-            <a:tailEnd type="arrow"/>
-          </a:ln>
-        </p:spPr>
-        <p:style>
-          <a:lnRef idx="1">
-            <a:schemeClr val="accent1"/>
-          </a:lnRef>
-          <a:fillRef idx="0">
-            <a:schemeClr val="accent1"/>
-          </a:fillRef>
-          <a:effectRef idx="0">
-            <a:schemeClr val="accent1"/>
-          </a:effectRef>
-          <a:fontRef idx="minor">
-            <a:schemeClr val="tx1"/>
-          </a:fontRef>
-        </p:style>
-      </p:cxnSp>
-      <p:sp>
-        <p:nvSpPr>
-          <p:cNvPr id="29" name="TextBox 28"/>
-          <p:cNvSpPr txBox="1"/>
-          <p:nvPr/>
-        </p:nvSpPr>
-        <p:spPr>
-          <a:xfrm>
-            <a:off x="2432288" y="3662049"/>
-            <a:ext cx="478156" cy="276999"/>
+            <a:off x="7772064" y="2149382"/>
+            <a:ext cx="754374" cy="276999"/>
           </a:xfrm>
           <a:prstGeom prst="rect">
             <a:avLst/>
           </a:prstGeom>
-          <a:noFill/>
         </p:spPr>
         <p:txBody>
-          <a:bodyPr wrap="square" rtlCol="0">
+          <a:bodyPr wrap="none">
             <a:spAutoFit/>
           </a:bodyPr>
           <a:lstStyle/>
           <a:p>
             <a:r>
               <a:rPr lang="da-DK" sz="1200" dirty="0" smtClean="0"/>
-              <a:t>No</a:t>
+              <a:t>Detected</a:t>
+            </a:r>
+            <a:endParaRPr lang="da-DK" sz="1200" dirty="0"/>
+          </a:p>
+        </p:txBody>
+      </p:sp>
+      <p:sp>
+        <p:nvSpPr>
+          <p:cNvPr id="75" name="Rectangle 74"/>
+          <p:cNvSpPr/>
+          <p:nvPr/>
+        </p:nvSpPr>
+        <p:spPr>
+          <a:xfrm>
+            <a:off x="5223562" y="2149381"/>
+            <a:ext cx="1007648" cy="276999"/>
+          </a:xfrm>
+          <a:prstGeom prst="rect">
+            <a:avLst/>
+          </a:prstGeom>
+        </p:spPr>
+        <p:txBody>
+          <a:bodyPr wrap="none">
+            <a:spAutoFit/>
+          </a:bodyPr>
+          <a:lstStyle/>
+          <a:p>
+            <a:r>
+              <a:rPr lang="da-DK" sz="1200" dirty="0" smtClean="0"/>
+              <a:t>Not detected</a:t>
             </a:r>
             <a:endParaRPr lang="da-DK" sz="1200" dirty="0"/>
           </a:p>
@@ -3864,17 +3845,17 @@
       </p:sp>
       <p:cxnSp>
         <p:nvCxnSpPr>
-          <p:cNvPr id="17" name="Straight Arrow Connector 16"/>
+          <p:cNvPr id="80" name="Straight Arrow Connector 79"/>
           <p:cNvCxnSpPr>
-            <a:stCxn id="9" idx="2"/>
+            <a:stCxn id="64" idx="2"/>
             <a:endCxn id="21" idx="0"/>
           </p:cNvCxnSpPr>
           <p:nvPr/>
         </p:nvCxnSpPr>
         <p:spPr>
           <a:xfrm>
-            <a:off x="1583668" y="5229200"/>
-            <a:ext cx="0" cy="576064"/>
+            <a:off x="7776306" y="3206734"/>
+            <a:ext cx="51" cy="222266"/>
           </a:xfrm>
           <a:prstGeom prst="straightConnector1">
             <a:avLst/>
@@ -3898,6 +3879,72 @@
           </a:fontRef>
         </p:style>
       </p:cxnSp>
+      <p:cxnSp>
+        <p:nvCxnSpPr>
+          <p:cNvPr id="85" name="Straight Arrow Connector 84"/>
+          <p:cNvCxnSpPr>
+            <a:stCxn id="9" idx="2"/>
+            <a:endCxn id="64" idx="0"/>
+          </p:cNvCxnSpPr>
+          <p:nvPr/>
+        </p:nvCxnSpPr>
+        <p:spPr>
+          <a:xfrm flipH="1">
+            <a:off x="7776306" y="1660122"/>
+            <a:ext cx="50" cy="904782"/>
+          </a:xfrm>
+          <a:prstGeom prst="straightConnector1">
+            <a:avLst/>
+          </a:prstGeom>
+          <a:ln>
+            <a:tailEnd type="arrow"/>
+          </a:ln>
+        </p:spPr>
+        <p:style>
+          <a:lnRef idx="1">
+            <a:schemeClr val="accent1"/>
+          </a:lnRef>
+          <a:fillRef idx="0">
+            <a:schemeClr val="accent1"/>
+          </a:fillRef>
+          <a:effectRef idx="0">
+            <a:schemeClr val="accent1"/>
+          </a:effectRef>
+          <a:fontRef idx="minor">
+            <a:schemeClr val="tx1"/>
+          </a:fontRef>
+        </p:style>
+      </p:cxnSp>
+      <p:sp>
+        <p:nvSpPr>
+          <p:cNvPr id="88" name="TextBox 87"/>
+          <p:cNvSpPr txBox="1"/>
+          <p:nvPr/>
+        </p:nvSpPr>
+        <p:spPr>
+          <a:xfrm>
+            <a:off x="1299616" y="276295"/>
+            <a:ext cx="568104" cy="276999"/>
+          </a:xfrm>
+          <a:prstGeom prst="rect">
+            <a:avLst/>
+          </a:prstGeom>
+          <a:noFill/>
+        </p:spPr>
+        <p:txBody>
+          <a:bodyPr wrap="none" rtlCol="0">
+            <a:spAutoFit/>
+          </a:bodyPr>
+          <a:lstStyle/>
+          <a:p>
+            <a:r>
+              <a:rPr lang="da-DK" sz="1200" dirty="0" smtClean="0"/>
+              <a:t>Image</a:t>
+            </a:r>
+            <a:endParaRPr lang="da-DK" dirty="0"/>
+          </a:p>
+        </p:txBody>
+      </p:sp>
     </p:spTree>
     <p:extLst>
       <p:ext uri="{BB962C8B-B14F-4D97-AF65-F5344CB8AC3E}">

</xml_diff>

<commit_message>
change in table locate
</commit_message>
<xml_diff>
--- a/rapport/images/tabledetect_flowchart.pptx
+++ b/rapport/images/tabledetect_flowchart.pptx
@@ -288,7 +288,7 @@
           <a:p>
             <a:fld id="{B14A1F59-A5BB-4789-B214-DB344DA8E5FB}" type="datetimeFigureOut">
               <a:rPr lang="da-DK" smtClean="0"/>
-              <a:t>25-04-2011</a:t>
+              <a:t>10-05-2011</a:t>
             </a:fld>
             <a:endParaRPr lang="da-DK"/>
           </a:p>
@@ -458,7 +458,7 @@
           <a:p>
             <a:fld id="{B14A1F59-A5BB-4789-B214-DB344DA8E5FB}" type="datetimeFigureOut">
               <a:rPr lang="da-DK" smtClean="0"/>
-              <a:t>25-04-2011</a:t>
+              <a:t>10-05-2011</a:t>
             </a:fld>
             <a:endParaRPr lang="da-DK"/>
           </a:p>
@@ -638,7 +638,7 @@
           <a:p>
             <a:fld id="{B14A1F59-A5BB-4789-B214-DB344DA8E5FB}" type="datetimeFigureOut">
               <a:rPr lang="da-DK" smtClean="0"/>
-              <a:t>25-04-2011</a:t>
+              <a:t>10-05-2011</a:t>
             </a:fld>
             <a:endParaRPr lang="da-DK"/>
           </a:p>
@@ -808,7 +808,7 @@
           <a:p>
             <a:fld id="{B14A1F59-A5BB-4789-B214-DB344DA8E5FB}" type="datetimeFigureOut">
               <a:rPr lang="da-DK" smtClean="0"/>
-              <a:t>25-04-2011</a:t>
+              <a:t>10-05-2011</a:t>
             </a:fld>
             <a:endParaRPr lang="da-DK"/>
           </a:p>
@@ -1054,7 +1054,7 @@
           <a:p>
             <a:fld id="{B14A1F59-A5BB-4789-B214-DB344DA8E5FB}" type="datetimeFigureOut">
               <a:rPr lang="da-DK" smtClean="0"/>
-              <a:t>25-04-2011</a:t>
+              <a:t>10-05-2011</a:t>
             </a:fld>
             <a:endParaRPr lang="da-DK"/>
           </a:p>
@@ -1342,7 +1342,7 @@
           <a:p>
             <a:fld id="{B14A1F59-A5BB-4789-B214-DB344DA8E5FB}" type="datetimeFigureOut">
               <a:rPr lang="da-DK" smtClean="0"/>
-              <a:t>25-04-2011</a:t>
+              <a:t>10-05-2011</a:t>
             </a:fld>
             <a:endParaRPr lang="da-DK"/>
           </a:p>
@@ -1764,7 +1764,7 @@
           <a:p>
             <a:fld id="{B14A1F59-A5BB-4789-B214-DB344DA8E5FB}" type="datetimeFigureOut">
               <a:rPr lang="da-DK" smtClean="0"/>
-              <a:t>25-04-2011</a:t>
+              <a:t>10-05-2011</a:t>
             </a:fld>
             <a:endParaRPr lang="da-DK"/>
           </a:p>
@@ -1882,7 +1882,7 @@
           <a:p>
             <a:fld id="{B14A1F59-A5BB-4789-B214-DB344DA8E5FB}" type="datetimeFigureOut">
               <a:rPr lang="da-DK" smtClean="0"/>
-              <a:t>25-04-2011</a:t>
+              <a:t>10-05-2011</a:t>
             </a:fld>
             <a:endParaRPr lang="da-DK"/>
           </a:p>
@@ -1977,7 +1977,7 @@
           <a:p>
             <a:fld id="{B14A1F59-A5BB-4789-B214-DB344DA8E5FB}" type="datetimeFigureOut">
               <a:rPr lang="da-DK" smtClean="0"/>
-              <a:t>25-04-2011</a:t>
+              <a:t>10-05-2011</a:t>
             </a:fld>
             <a:endParaRPr lang="da-DK"/>
           </a:p>
@@ -2254,7 +2254,7 @@
           <a:p>
             <a:fld id="{B14A1F59-A5BB-4789-B214-DB344DA8E5FB}" type="datetimeFigureOut">
               <a:rPr lang="da-DK" smtClean="0"/>
-              <a:t>25-04-2011</a:t>
+              <a:t>10-05-2011</a:t>
             </a:fld>
             <a:endParaRPr lang="da-DK"/>
           </a:p>
@@ -2507,7 +2507,7 @@
           <a:p>
             <a:fld id="{B14A1F59-A5BB-4789-B214-DB344DA8E5FB}" type="datetimeFigureOut">
               <a:rPr lang="da-DK" smtClean="0"/>
-              <a:t>25-04-2011</a:t>
+              <a:t>10-05-2011</a:t>
             </a:fld>
             <a:endParaRPr lang="da-DK"/>
           </a:p>
@@ -2720,7 +2720,7 @@
           <a:p>
             <a:fld id="{B14A1F59-A5BB-4789-B214-DB344DA8E5FB}" type="datetimeFigureOut">
               <a:rPr lang="da-DK" smtClean="0"/>
-              <a:t>25-04-2011</a:t>
+              <a:t>10-05-2011</a:t>
             </a:fld>
             <a:endParaRPr lang="da-DK"/>
           </a:p>
@@ -3097,41 +3097,44 @@
       </p:grpSpPr>
       <p:sp>
         <p:nvSpPr>
-          <p:cNvPr id="4" name="Rounded Rectangle 3"/>
+          <p:cNvPr id="6" name="Flowchart: Process 5"/>
           <p:cNvSpPr/>
           <p:nvPr/>
         </p:nvSpPr>
         <p:spPr>
           <a:xfrm>
-            <a:off x="899592" y="980728"/>
-            <a:ext cx="1368152" cy="641830"/>
+            <a:off x="35099" y="739840"/>
+            <a:ext cx="1450424" cy="596408"/>
           </a:xfrm>
-          <a:prstGeom prst="roundRect">
+          <a:prstGeom prst="flowChartProcess">
             <a:avLst/>
           </a:prstGeom>
-          <a:solidFill>
-            <a:schemeClr val="bg1"/>
-          </a:solidFill>
         </p:spPr>
         <p:style>
           <a:lnRef idx="2">
-            <a:schemeClr val="accent1">
-              <a:shade val="50000"/>
-            </a:schemeClr>
+            <a:schemeClr val="accent1"/>
           </a:lnRef>
           <a:fillRef idx="1">
-            <a:schemeClr val="accent1"/>
+            <a:schemeClr val="lt1"/>
           </a:fillRef>
           <a:effectRef idx="0">
             <a:schemeClr val="accent1"/>
           </a:effectRef>
           <a:fontRef idx="minor">
-            <a:schemeClr val="lt1"/>
+            <a:schemeClr val="dk1"/>
           </a:fontRef>
         </p:style>
         <p:txBody>
           <a:bodyPr rtlCol="0" anchor="ctr"/>
           <a:lstStyle/>
+          <a:p>
+            <a:pPr algn="ctr"/>
+            <a:endParaRPr lang="da-DK" sz="1200" dirty="0" smtClean="0">
+              <a:solidFill>
+                <a:schemeClr val="tx1"/>
+              </a:solidFill>
+            </a:endParaRPr>
+          </a:p>
           <a:p>
             <a:pPr algn="ctr"/>
             <a:r>
@@ -3140,7 +3143,134 @@
                   <a:schemeClr val="tx1"/>
                 </a:solidFill>
               </a:rPr>
-              <a:t>Convert to HSV and use the hue.</a:t>
+              <a:t>Convert </a:t>
+            </a:r>
+            <a:r>
+              <a:rPr lang="da-DK" sz="1200" dirty="0">
+                <a:solidFill>
+                  <a:schemeClr val="tx1"/>
+                </a:solidFill>
+              </a:rPr>
+              <a:t>to HSV and use the hue.</a:t>
+            </a:r>
+          </a:p>
+          <a:p>
+            <a:pPr algn="ctr"/>
+            <a:endParaRPr lang="da-DK" sz="1200" dirty="0"/>
+          </a:p>
+        </p:txBody>
+      </p:sp>
+      <p:sp>
+        <p:nvSpPr>
+          <p:cNvPr id="27" name="Flowchart: Process 26"/>
+          <p:cNvSpPr/>
+          <p:nvPr/>
+        </p:nvSpPr>
+        <p:spPr>
+          <a:xfrm>
+            <a:off x="1699822" y="739840"/>
+            <a:ext cx="1450424" cy="596408"/>
+          </a:xfrm>
+          <a:prstGeom prst="flowChartProcess">
+            <a:avLst/>
+          </a:prstGeom>
+        </p:spPr>
+        <p:style>
+          <a:lnRef idx="2">
+            <a:schemeClr val="accent1"/>
+          </a:lnRef>
+          <a:fillRef idx="1">
+            <a:schemeClr val="lt1"/>
+          </a:fillRef>
+          <a:effectRef idx="0">
+            <a:schemeClr val="accent1"/>
+          </a:effectRef>
+          <a:fontRef idx="minor">
+            <a:schemeClr val="dk1"/>
+          </a:fontRef>
+        </p:style>
+        <p:txBody>
+          <a:bodyPr rtlCol="0" anchor="ctr"/>
+          <a:lstStyle/>
+          <a:p>
+            <a:pPr algn="ctr"/>
+            <a:endParaRPr lang="da-DK" sz="1200" dirty="0" smtClean="0">
+              <a:solidFill>
+                <a:schemeClr val="tx1"/>
+              </a:solidFill>
+            </a:endParaRPr>
+          </a:p>
+          <a:p>
+            <a:pPr algn="ctr"/>
+            <a:r>
+              <a:rPr lang="da-DK" sz="1200" dirty="0">
+                <a:solidFill>
+                  <a:schemeClr val="tx1"/>
+                </a:solidFill>
+              </a:rPr>
+              <a:t>Make histogram from hue image</a:t>
+            </a:r>
+            <a:endParaRPr lang="da-DK" sz="1400" dirty="0">
+              <a:solidFill>
+                <a:schemeClr val="tx1"/>
+              </a:solidFill>
+            </a:endParaRPr>
+          </a:p>
+          <a:p>
+            <a:pPr algn="ctr"/>
+            <a:endParaRPr lang="da-DK" sz="1200" dirty="0"/>
+          </a:p>
+        </p:txBody>
+      </p:sp>
+      <p:sp>
+        <p:nvSpPr>
+          <p:cNvPr id="28" name="Flowchart: Process 27"/>
+          <p:cNvSpPr/>
+          <p:nvPr/>
+        </p:nvSpPr>
+        <p:spPr>
+          <a:xfrm>
+            <a:off x="3326149" y="642000"/>
+            <a:ext cx="1450424" cy="792088"/>
+          </a:xfrm>
+          <a:prstGeom prst="flowChartProcess">
+            <a:avLst/>
+          </a:prstGeom>
+        </p:spPr>
+        <p:style>
+          <a:lnRef idx="2">
+            <a:schemeClr val="accent1"/>
+          </a:lnRef>
+          <a:fillRef idx="1">
+            <a:schemeClr val="lt1"/>
+          </a:fillRef>
+          <a:effectRef idx="0">
+            <a:schemeClr val="accent1"/>
+          </a:effectRef>
+          <a:fontRef idx="minor">
+            <a:schemeClr val="dk1"/>
+          </a:fontRef>
+        </p:style>
+        <p:txBody>
+          <a:bodyPr rtlCol="0" anchor="ctr"/>
+          <a:lstStyle/>
+          <a:p>
+            <a:pPr algn="ctr"/>
+            <a:endParaRPr lang="da-DK" sz="1200" dirty="0" smtClean="0">
+              <a:solidFill>
+                <a:schemeClr val="tx1"/>
+              </a:solidFill>
+            </a:endParaRPr>
+          </a:p>
+          <a:p>
+            <a:pPr algn="ctr"/>
+            <a:r>
+              <a:rPr lang="da-DK" sz="1200" dirty="0" smtClean="0">
+                <a:solidFill>
+                  <a:schemeClr val="tx1"/>
+                </a:solidFill>
+              </a:rPr>
+              <a:t>Set pixels within 20 values from maximum hue value to white.</a:t>
             </a:r>
             <a:endParaRPr lang="da-DK" sz="1200" dirty="0">
               <a:solidFill>
@@ -3148,45 +3278,52 @@
               </a:solidFill>
             </a:endParaRPr>
           </a:p>
-        </p:txBody>
-      </p:sp>
-      <p:sp>
-        <p:nvSpPr>
-          <p:cNvPr id="5" name="Rounded Rectangle 4"/>
+          <a:p>
+            <a:pPr algn="ctr"/>
+            <a:endParaRPr lang="da-DK" sz="1200" dirty="0"/>
+          </a:p>
+        </p:txBody>
+      </p:sp>
+      <p:sp>
+        <p:nvSpPr>
+          <p:cNvPr id="29" name="Flowchart: Process 28"/>
           <p:cNvSpPr/>
           <p:nvPr/>
         </p:nvSpPr>
         <p:spPr>
           <a:xfrm>
-            <a:off x="2432288" y="980728"/>
-            <a:ext cx="1368152" cy="641830"/>
+            <a:off x="4967139" y="739840"/>
+            <a:ext cx="1450424" cy="596408"/>
           </a:xfrm>
-          <a:prstGeom prst="roundRect">
+          <a:prstGeom prst="flowChartProcess">
             <a:avLst/>
           </a:prstGeom>
-          <a:solidFill>
-            <a:schemeClr val="bg1"/>
-          </a:solidFill>
         </p:spPr>
         <p:style>
           <a:lnRef idx="2">
-            <a:schemeClr val="accent1">
-              <a:shade val="50000"/>
-            </a:schemeClr>
+            <a:schemeClr val="accent1"/>
           </a:lnRef>
           <a:fillRef idx="1">
-            <a:schemeClr val="accent1"/>
+            <a:schemeClr val="lt1"/>
           </a:fillRef>
           <a:effectRef idx="0">
             <a:schemeClr val="accent1"/>
           </a:effectRef>
           <a:fontRef idx="minor">
-            <a:schemeClr val="lt1"/>
+            <a:schemeClr val="dk1"/>
           </a:fontRef>
         </p:style>
         <p:txBody>
           <a:bodyPr rtlCol="0" anchor="ctr"/>
           <a:lstStyle/>
+          <a:p>
+            <a:pPr algn="ctr"/>
+            <a:endParaRPr lang="da-DK" sz="1200" dirty="0" smtClean="0">
+              <a:solidFill>
+                <a:schemeClr val="tx1"/>
+              </a:solidFill>
+            </a:endParaRPr>
+          </a:p>
           <a:p>
             <a:pPr algn="ctr"/>
             <a:r>
@@ -3195,48 +3332,47 @@
                   <a:schemeClr val="tx1"/>
                 </a:solidFill>
               </a:rPr>
-              <a:t>Make histogram from hue image</a:t>
-            </a:r>
-            <a:endParaRPr lang="da-DK" sz="1400" dirty="0">
+              <a:t>Use median filter with kernelsize = 3.</a:t>
+            </a:r>
+            <a:endParaRPr lang="da-DK" sz="1200" dirty="0">
               <a:solidFill>
                 <a:schemeClr val="tx1"/>
               </a:solidFill>
             </a:endParaRPr>
           </a:p>
-        </p:txBody>
-      </p:sp>
-      <p:sp>
-        <p:nvSpPr>
-          <p:cNvPr id="7" name="Rounded Rectangle 6"/>
+          <a:p>
+            <a:pPr algn="ctr"/>
+            <a:endParaRPr lang="da-DK" sz="1200" dirty="0"/>
+          </a:p>
+        </p:txBody>
+      </p:sp>
+      <p:sp>
+        <p:nvSpPr>
+          <p:cNvPr id="30" name="Flowchart: Process 29"/>
           <p:cNvSpPr/>
           <p:nvPr/>
         </p:nvSpPr>
         <p:spPr>
           <a:xfrm>
-            <a:off x="3982124" y="943163"/>
-            <a:ext cx="1368152" cy="716959"/>
+            <a:off x="6695798" y="739840"/>
+            <a:ext cx="1450424" cy="596408"/>
           </a:xfrm>
-          <a:prstGeom prst="roundRect">
+          <a:prstGeom prst="flowChartProcess">
             <a:avLst/>
           </a:prstGeom>
-          <a:solidFill>
-            <a:schemeClr val="bg1"/>
-          </a:solidFill>
         </p:spPr>
         <p:style>
           <a:lnRef idx="2">
-            <a:schemeClr val="accent1">
-              <a:shade val="50000"/>
-            </a:schemeClr>
+            <a:schemeClr val="accent1"/>
           </a:lnRef>
           <a:fillRef idx="1">
-            <a:schemeClr val="accent1"/>
+            <a:schemeClr val="lt1"/>
           </a:fillRef>
           <a:effectRef idx="0">
             <a:schemeClr val="accent1"/>
           </a:effectRef>
           <a:fontRef idx="minor">
-            <a:schemeClr val="lt1"/>
+            <a:schemeClr val="dk1"/>
           </a:fontRef>
         </p:style>
         <p:txBody>
@@ -3244,114 +3380,12 @@
           <a:lstStyle/>
           <a:p>
             <a:pPr algn="ctr"/>
-            <a:r>
-              <a:rPr lang="da-DK" sz="1200" dirty="0" smtClean="0">
-                <a:solidFill>
-                  <a:schemeClr val="tx1"/>
-                </a:solidFill>
-              </a:rPr>
-              <a:t>Set pixels close to maximum hue value to 255, otherwise 0.</a:t>
-            </a:r>
-            <a:endParaRPr lang="da-DK" sz="1400" dirty="0">
+            <a:endParaRPr lang="da-DK" sz="1200" dirty="0" smtClean="0">
               <a:solidFill>
                 <a:schemeClr val="tx1"/>
               </a:solidFill>
             </a:endParaRPr>
           </a:p>
-        </p:txBody>
-      </p:sp>
-      <p:sp>
-        <p:nvSpPr>
-          <p:cNvPr id="8" name="Rounded Rectangle 7"/>
-          <p:cNvSpPr/>
-          <p:nvPr/>
-        </p:nvSpPr>
-        <p:spPr>
-          <a:xfrm>
-            <a:off x="5547134" y="980728"/>
-            <a:ext cx="1368152" cy="641830"/>
-          </a:xfrm>
-          <a:prstGeom prst="roundRect">
-            <a:avLst/>
-          </a:prstGeom>
-          <a:solidFill>
-            <a:schemeClr val="bg1"/>
-          </a:solidFill>
-        </p:spPr>
-        <p:style>
-          <a:lnRef idx="2">
-            <a:schemeClr val="accent1">
-              <a:shade val="50000"/>
-            </a:schemeClr>
-          </a:lnRef>
-          <a:fillRef idx="1">
-            <a:schemeClr val="accent1"/>
-          </a:fillRef>
-          <a:effectRef idx="0">
-            <a:schemeClr val="accent1"/>
-          </a:effectRef>
-          <a:fontRef idx="minor">
-            <a:schemeClr val="lt1"/>
-          </a:fontRef>
-        </p:style>
-        <p:txBody>
-          <a:bodyPr rtlCol="0" anchor="ctr"/>
-          <a:lstStyle/>
-          <a:p>
-            <a:pPr algn="ctr"/>
-            <a:r>
-              <a:rPr lang="da-DK" sz="1200" dirty="0" smtClean="0">
-                <a:solidFill>
-                  <a:schemeClr val="tx1"/>
-                </a:solidFill>
-              </a:rPr>
-              <a:t>Use median filter to remove noise.</a:t>
-            </a:r>
-            <a:endParaRPr lang="da-DK" sz="1400" dirty="0">
-              <a:solidFill>
-                <a:schemeClr val="tx1"/>
-              </a:solidFill>
-            </a:endParaRPr>
-          </a:p>
-        </p:txBody>
-      </p:sp>
-      <p:sp>
-        <p:nvSpPr>
-          <p:cNvPr id="9" name="Rounded Rectangle 8"/>
-          <p:cNvSpPr/>
-          <p:nvPr/>
-        </p:nvSpPr>
-        <p:spPr>
-          <a:xfrm>
-            <a:off x="7092280" y="945364"/>
-            <a:ext cx="1368152" cy="714758"/>
-          </a:xfrm>
-          <a:prstGeom prst="roundRect">
-            <a:avLst/>
-          </a:prstGeom>
-          <a:solidFill>
-            <a:schemeClr val="bg1"/>
-          </a:solidFill>
-        </p:spPr>
-        <p:style>
-          <a:lnRef idx="2">
-            <a:schemeClr val="accent1">
-              <a:shade val="50000"/>
-            </a:schemeClr>
-          </a:lnRef>
-          <a:fillRef idx="1">
-            <a:schemeClr val="accent1"/>
-          </a:fillRef>
-          <a:effectRef idx="0">
-            <a:schemeClr val="accent1"/>
-          </a:effectRef>
-          <a:fontRef idx="minor">
-            <a:schemeClr val="lt1"/>
-          </a:fontRef>
-        </p:style>
-        <p:txBody>
-          <a:bodyPr rtlCol="0" anchor="ctr"/>
-          <a:lstStyle/>
           <a:p>
             <a:pPr algn="ctr"/>
             <a:r>
@@ -3362,207 +3396,31 @@
               </a:rPr>
               <a:t>Detect bounding box of cloth.</a:t>
             </a:r>
-            <a:endParaRPr lang="da-DK" sz="1400" dirty="0">
-              <a:solidFill>
-                <a:schemeClr val="tx1"/>
-              </a:solidFill>
-            </a:endParaRPr>
-          </a:p>
-        </p:txBody>
-      </p:sp>
-      <p:sp>
-        <p:nvSpPr>
-          <p:cNvPr id="21" name="Rounded Rectangle 20"/>
-          <p:cNvSpPr/>
-          <p:nvPr/>
-        </p:nvSpPr>
-        <p:spPr>
-          <a:xfrm>
-            <a:off x="7092281" y="3429000"/>
-            <a:ext cx="1368152" cy="641830"/>
-          </a:xfrm>
-          <a:prstGeom prst="roundRect">
-            <a:avLst/>
-          </a:prstGeom>
-          <a:solidFill>
-            <a:schemeClr val="bg1"/>
-          </a:solidFill>
-        </p:spPr>
-        <p:style>
-          <a:lnRef idx="2">
-            <a:schemeClr val="accent1">
-              <a:shade val="50000"/>
-            </a:schemeClr>
-          </a:lnRef>
-          <a:fillRef idx="1">
-            <a:schemeClr val="accent1"/>
-          </a:fillRef>
-          <a:effectRef idx="0">
-            <a:schemeClr val="accent1"/>
-          </a:effectRef>
-          <a:fontRef idx="minor">
-            <a:schemeClr val="lt1"/>
-          </a:fontRef>
-        </p:style>
-        <p:txBody>
-          <a:bodyPr rtlCol="0" anchor="ctr"/>
-          <a:lstStyle/>
-          <a:p>
-            <a:pPr algn="ctr"/>
-            <a:r>
-              <a:rPr lang="da-DK" sz="1200" dirty="0" smtClean="0">
-                <a:solidFill>
-                  <a:schemeClr val="tx1"/>
-                </a:solidFill>
-              </a:rPr>
-              <a:t>Output angle and </a:t>
-            </a:r>
-            <a:r>
-              <a:rPr lang="da-DK" sz="1200" dirty="0" smtClean="0">
-                <a:solidFill>
-                  <a:schemeClr val="tx1"/>
-                </a:solidFill>
-              </a:rPr>
-              <a:t>ROI</a:t>
-            </a:r>
             <a:endParaRPr lang="da-DK" sz="1200" dirty="0">
               <a:solidFill>
                 <a:schemeClr val="tx1"/>
               </a:solidFill>
             </a:endParaRPr>
           </a:p>
-        </p:txBody>
-      </p:sp>
-      <p:sp>
-        <p:nvSpPr>
-          <p:cNvPr id="38" name="Rounded Rectangle 37"/>
-          <p:cNvSpPr/>
-          <p:nvPr/>
-        </p:nvSpPr>
-        <p:spPr>
-          <a:xfrm>
-            <a:off x="4572000" y="2567583"/>
-            <a:ext cx="1368152" cy="641830"/>
-          </a:xfrm>
-          <a:prstGeom prst="roundRect">
-            <a:avLst/>
-          </a:prstGeom>
-          <a:solidFill>
-            <a:schemeClr val="bg1"/>
-          </a:solidFill>
-        </p:spPr>
-        <p:style>
-          <a:lnRef idx="2">
-            <a:schemeClr val="accent1">
-              <a:shade val="50000"/>
-            </a:schemeClr>
-          </a:lnRef>
-          <a:fillRef idx="1">
-            <a:schemeClr val="accent1"/>
-          </a:fillRef>
-          <a:effectRef idx="0">
-            <a:schemeClr val="accent1"/>
-          </a:effectRef>
-          <a:fontRef idx="minor">
-            <a:schemeClr val="lt1"/>
-          </a:fontRef>
-        </p:style>
-        <p:txBody>
-          <a:bodyPr rtlCol="0" anchor="ctr"/>
-          <a:lstStyle/>
           <a:p>
             <a:pPr algn="ctr"/>
-            <a:r>
-              <a:rPr lang="da-DK" sz="1200" dirty="0" smtClean="0">
-                <a:solidFill>
-                  <a:schemeClr val="tx1"/>
-                </a:solidFill>
-              </a:rPr>
-              <a:t>Output failure </a:t>
-            </a:r>
-            <a:r>
-              <a:rPr lang="da-DK" sz="1200" dirty="0" smtClean="0">
-                <a:solidFill>
-                  <a:schemeClr val="tx1"/>
-                </a:solidFill>
-              </a:rPr>
-              <a:t>(</a:t>
-            </a:r>
-            <a:r>
-              <a:rPr lang="da-DK" sz="1200" dirty="0" smtClean="0">
-                <a:solidFill>
-                  <a:schemeClr val="tx1"/>
-                </a:solidFill>
-              </a:rPr>
-              <a:t>cloth not detected</a:t>
-            </a:r>
-            <a:r>
-              <a:rPr lang="da-DK" sz="1200" dirty="0" smtClean="0">
-                <a:solidFill>
-                  <a:schemeClr val="tx1"/>
-                </a:solidFill>
-              </a:rPr>
-              <a:t>)</a:t>
-            </a:r>
-            <a:endParaRPr lang="da-DK" sz="1200" dirty="0">
-              <a:solidFill>
-                <a:schemeClr val="tx1"/>
-              </a:solidFill>
-            </a:endParaRPr>
+            <a:endParaRPr lang="da-DK" sz="1200" dirty="0"/>
           </a:p>
         </p:txBody>
       </p:sp>
       <p:cxnSp>
         <p:nvCxnSpPr>
-          <p:cNvPr id="45" name="Straight Arrow Connector 44"/>
+          <p:cNvPr id="13" name="Straight Arrow Connector 12"/>
           <p:cNvCxnSpPr>
-            <a:endCxn id="4" idx="0"/>
+            <a:stCxn id="6" idx="3"/>
+            <a:endCxn id="27" idx="1"/>
           </p:cNvCxnSpPr>
           <p:nvPr/>
         </p:nvCxnSpPr>
         <p:spPr>
           <a:xfrm>
-            <a:off x="1583668" y="548680"/>
-            <a:ext cx="0" cy="432048"/>
-          </a:xfrm>
-          <a:prstGeom prst="straightConnector1">
-            <a:avLst/>
-          </a:prstGeom>
-          <a:ln w="12700">
-            <a:solidFill>
-              <a:srgbClr val="0070C0"/>
-            </a:solidFill>
-            <a:tailEnd type="arrow"/>
-          </a:ln>
-        </p:spPr>
-        <p:style>
-          <a:lnRef idx="1">
-            <a:schemeClr val="accent1"/>
-          </a:lnRef>
-          <a:fillRef idx="0">
-            <a:schemeClr val="accent1"/>
-          </a:fillRef>
-          <a:effectRef idx="0">
-            <a:schemeClr val="accent1"/>
-          </a:effectRef>
-          <a:fontRef idx="minor">
-            <a:schemeClr val="tx1"/>
-          </a:fontRef>
-        </p:style>
-      </p:cxnSp>
-      <p:cxnSp>
-        <p:nvCxnSpPr>
-          <p:cNvPr id="36" name="Straight Arrow Connector 35"/>
-          <p:cNvCxnSpPr>
-            <a:stCxn id="4" idx="3"/>
-            <a:endCxn id="5" idx="1"/>
-          </p:cNvCxnSpPr>
-          <p:nvPr/>
-        </p:nvCxnSpPr>
-        <p:spPr>
-          <a:xfrm>
-            <a:off x="2267744" y="1301643"/>
-            <a:ext cx="164544" cy="0"/>
+            <a:off x="1485523" y="1038044"/>
+            <a:ext cx="214299" cy="0"/>
           </a:xfrm>
           <a:prstGeom prst="straightConnector1">
             <a:avLst/>
@@ -3572,33 +3430,33 @@
           </a:ln>
         </p:spPr>
         <p:style>
-          <a:lnRef idx="1">
+          <a:lnRef idx="2">
             <a:schemeClr val="accent1"/>
           </a:lnRef>
-          <a:fillRef idx="0">
-            <a:schemeClr val="accent1"/>
+          <a:fillRef idx="1">
+            <a:schemeClr val="lt1"/>
           </a:fillRef>
           <a:effectRef idx="0">
             <a:schemeClr val="accent1"/>
           </a:effectRef>
           <a:fontRef idx="minor">
-            <a:schemeClr val="tx1"/>
+            <a:schemeClr val="dk1"/>
           </a:fontRef>
         </p:style>
       </p:cxnSp>
       <p:cxnSp>
         <p:nvCxnSpPr>
-          <p:cNvPr id="39" name="Straight Arrow Connector 38"/>
+          <p:cNvPr id="15" name="Straight Arrow Connector 14"/>
           <p:cNvCxnSpPr>
-            <a:stCxn id="5" idx="3"/>
-            <a:endCxn id="7" idx="1"/>
+            <a:stCxn id="27" idx="3"/>
+            <a:endCxn id="28" idx="1"/>
           </p:cNvCxnSpPr>
           <p:nvPr/>
         </p:nvCxnSpPr>
         <p:spPr>
           <a:xfrm>
-            <a:off x="3800440" y="1301643"/>
-            <a:ext cx="181684" cy="0"/>
+            <a:off x="3150246" y="1038044"/>
+            <a:ext cx="175903" cy="0"/>
           </a:xfrm>
           <a:prstGeom prst="straightConnector1">
             <a:avLst/>
@@ -3608,33 +3466,33 @@
           </a:ln>
         </p:spPr>
         <p:style>
-          <a:lnRef idx="1">
+          <a:lnRef idx="2">
             <a:schemeClr val="accent1"/>
           </a:lnRef>
-          <a:fillRef idx="0">
-            <a:schemeClr val="accent1"/>
+          <a:fillRef idx="1">
+            <a:schemeClr val="lt1"/>
           </a:fillRef>
           <a:effectRef idx="0">
             <a:schemeClr val="accent1"/>
           </a:effectRef>
           <a:fontRef idx="minor">
-            <a:schemeClr val="tx1"/>
+            <a:schemeClr val="dk1"/>
           </a:fontRef>
         </p:style>
       </p:cxnSp>
       <p:cxnSp>
         <p:nvCxnSpPr>
-          <p:cNvPr id="41" name="Straight Arrow Connector 40"/>
+          <p:cNvPr id="17" name="Straight Arrow Connector 16"/>
           <p:cNvCxnSpPr>
-            <a:stCxn id="7" idx="3"/>
-            <a:endCxn id="8" idx="1"/>
+            <a:stCxn id="28" idx="3"/>
+            <a:endCxn id="29" idx="1"/>
           </p:cNvCxnSpPr>
           <p:nvPr/>
         </p:nvCxnSpPr>
         <p:spPr>
           <a:xfrm>
-            <a:off x="5350276" y="1301643"/>
-            <a:ext cx="196858" cy="0"/>
+            <a:off x="4776573" y="1038044"/>
+            <a:ext cx="190566" cy="0"/>
           </a:xfrm>
           <a:prstGeom prst="straightConnector1">
             <a:avLst/>
@@ -3644,33 +3502,33 @@
           </a:ln>
         </p:spPr>
         <p:style>
-          <a:lnRef idx="1">
+          <a:lnRef idx="2">
             <a:schemeClr val="accent1"/>
           </a:lnRef>
-          <a:fillRef idx="0">
-            <a:schemeClr val="accent1"/>
+          <a:fillRef idx="1">
+            <a:schemeClr val="lt1"/>
           </a:fillRef>
           <a:effectRef idx="0">
             <a:schemeClr val="accent1"/>
           </a:effectRef>
           <a:fontRef idx="minor">
-            <a:schemeClr val="tx1"/>
+            <a:schemeClr val="dk1"/>
           </a:fontRef>
         </p:style>
       </p:cxnSp>
       <p:cxnSp>
         <p:nvCxnSpPr>
-          <p:cNvPr id="55" name="Straight Arrow Connector 54"/>
+          <p:cNvPr id="19" name="Straight Arrow Connector 18"/>
           <p:cNvCxnSpPr>
-            <a:stCxn id="8" idx="3"/>
-            <a:endCxn id="9" idx="1"/>
+            <a:stCxn id="29" idx="3"/>
+            <a:endCxn id="30" idx="1"/>
           </p:cNvCxnSpPr>
           <p:nvPr/>
         </p:nvCxnSpPr>
         <p:spPr>
           <a:xfrm>
-            <a:off x="6915286" y="1301643"/>
-            <a:ext cx="176994" cy="1100"/>
+            <a:off x="6417563" y="1038044"/>
+            <a:ext cx="278235" cy="0"/>
           </a:xfrm>
           <a:prstGeom prst="straightConnector1">
             <a:avLst/>
@@ -3680,52 +3538,47 @@
           </a:ln>
         </p:spPr>
         <p:style>
-          <a:lnRef idx="1">
+          <a:lnRef idx="2">
             <a:schemeClr val="accent1"/>
           </a:lnRef>
-          <a:fillRef idx="0">
-            <a:schemeClr val="accent1"/>
+          <a:fillRef idx="1">
+            <a:schemeClr val="lt1"/>
           </a:fillRef>
           <a:effectRef idx="0">
             <a:schemeClr val="accent1"/>
           </a:effectRef>
           <a:fontRef idx="minor">
-            <a:schemeClr val="tx1"/>
+            <a:schemeClr val="dk1"/>
           </a:fontRef>
         </p:style>
       </p:cxnSp>
       <p:sp>
         <p:nvSpPr>
-          <p:cNvPr id="64" name="Rounded Rectangle 63"/>
+          <p:cNvPr id="42" name="Flowchart: Decision 41"/>
           <p:cNvSpPr/>
           <p:nvPr/>
         </p:nvSpPr>
         <p:spPr>
           <a:xfrm>
-            <a:off x="7092230" y="2564904"/>
-            <a:ext cx="1368152" cy="641830"/>
+            <a:off x="6581722" y="1722120"/>
+            <a:ext cx="1678576" cy="558170"/>
           </a:xfrm>
-          <a:prstGeom prst="roundRect">
+          <a:prstGeom prst="flowChartDecision">
             <a:avLst/>
           </a:prstGeom>
-          <a:solidFill>
-            <a:schemeClr val="bg1"/>
-          </a:solidFill>
         </p:spPr>
         <p:style>
           <a:lnRef idx="2">
-            <a:schemeClr val="accent1">
-              <a:shade val="50000"/>
-            </a:schemeClr>
+            <a:schemeClr val="accent1"/>
           </a:lnRef>
           <a:fillRef idx="1">
-            <a:schemeClr val="accent1"/>
+            <a:schemeClr val="lt1"/>
           </a:fillRef>
           <a:effectRef idx="0">
             <a:schemeClr val="accent1"/>
           </a:effectRef>
           <a:fontRef idx="minor">
-            <a:schemeClr val="lt1"/>
+            <a:schemeClr val="dk1"/>
           </a:fontRef>
         </p:style>
         <p:txBody>
@@ -3739,7 +3592,7 @@
                   <a:schemeClr val="tx1"/>
                 </a:solidFill>
               </a:rPr>
-              <a:t>Find angle of the cloth.</a:t>
+              <a:t>Detected?</a:t>
             </a:r>
             <a:endParaRPr lang="da-DK" sz="1200" dirty="0">
               <a:solidFill>
@@ -3751,111 +3604,17 @@
       </p:sp>
       <p:cxnSp>
         <p:nvCxnSpPr>
-          <p:cNvPr id="70" name="Elbow Connector 69"/>
+          <p:cNvPr id="44" name="Straight Arrow Connector 43"/>
           <p:cNvCxnSpPr>
-            <a:stCxn id="9" idx="2"/>
-            <a:endCxn id="38" idx="0"/>
-          </p:cNvCxnSpPr>
-          <p:nvPr/>
-        </p:nvCxnSpPr>
-        <p:spPr>
-          <a:xfrm rot="5400000">
-            <a:off x="6062486" y="853712"/>
-            <a:ext cx="907461" cy="2520280"/>
-          </a:xfrm>
-          <a:prstGeom prst="bentConnector3">
-            <a:avLst/>
-          </a:prstGeom>
-          <a:ln>
-            <a:tailEnd type="arrow"/>
-          </a:ln>
-        </p:spPr>
-        <p:style>
-          <a:lnRef idx="1">
-            <a:schemeClr val="accent1"/>
-          </a:lnRef>
-          <a:fillRef idx="0">
-            <a:schemeClr val="accent1"/>
-          </a:fillRef>
-          <a:effectRef idx="0">
-            <a:schemeClr val="accent1"/>
-          </a:effectRef>
-          <a:fontRef idx="minor">
-            <a:schemeClr val="tx1"/>
-          </a:fontRef>
-        </p:style>
-      </p:cxnSp>
-      <p:sp>
-        <p:nvSpPr>
-          <p:cNvPr id="74" name="Rectangle 73"/>
-          <p:cNvSpPr/>
-          <p:nvPr/>
-        </p:nvSpPr>
-        <p:spPr>
-          <a:xfrm>
-            <a:off x="7772064" y="2149382"/>
-            <a:ext cx="754374" cy="276999"/>
-          </a:xfrm>
-          <a:prstGeom prst="rect">
-            <a:avLst/>
-          </a:prstGeom>
-        </p:spPr>
-        <p:txBody>
-          <a:bodyPr wrap="none">
-            <a:spAutoFit/>
-          </a:bodyPr>
-          <a:lstStyle/>
-          <a:p>
-            <a:r>
-              <a:rPr lang="da-DK" sz="1200" dirty="0" smtClean="0"/>
-              <a:t>Detected</a:t>
-            </a:r>
-            <a:endParaRPr lang="da-DK" sz="1200" dirty="0"/>
-          </a:p>
-        </p:txBody>
-      </p:sp>
-      <p:sp>
-        <p:nvSpPr>
-          <p:cNvPr id="75" name="Rectangle 74"/>
-          <p:cNvSpPr/>
-          <p:nvPr/>
-        </p:nvSpPr>
-        <p:spPr>
-          <a:xfrm>
-            <a:off x="5223562" y="2149381"/>
-            <a:ext cx="1007648" cy="276999"/>
-          </a:xfrm>
-          <a:prstGeom prst="rect">
-            <a:avLst/>
-          </a:prstGeom>
-        </p:spPr>
-        <p:txBody>
-          <a:bodyPr wrap="none">
-            <a:spAutoFit/>
-          </a:bodyPr>
-          <a:lstStyle/>
-          <a:p>
-            <a:r>
-              <a:rPr lang="da-DK" sz="1200" dirty="0" smtClean="0"/>
-              <a:t>Not detected</a:t>
-            </a:r>
-            <a:endParaRPr lang="da-DK" sz="1200" dirty="0"/>
-          </a:p>
-        </p:txBody>
-      </p:sp>
-      <p:cxnSp>
-        <p:nvCxnSpPr>
-          <p:cNvPr id="80" name="Straight Arrow Connector 79"/>
-          <p:cNvCxnSpPr>
-            <a:stCxn id="64" idx="2"/>
-            <a:endCxn id="21" idx="0"/>
+            <a:stCxn id="30" idx="2"/>
+            <a:endCxn id="42" idx="0"/>
           </p:cNvCxnSpPr>
           <p:nvPr/>
         </p:nvCxnSpPr>
         <p:spPr>
           <a:xfrm>
-            <a:off x="7776306" y="3206734"/>
-            <a:ext cx="51" cy="222266"/>
+            <a:off x="7421010" y="1336248"/>
+            <a:ext cx="0" cy="385872"/>
           </a:xfrm>
           <a:prstGeom prst="straightConnector1">
             <a:avLst/>
@@ -3865,33 +3624,32 @@
           </a:ln>
         </p:spPr>
         <p:style>
-          <a:lnRef idx="1">
+          <a:lnRef idx="2">
             <a:schemeClr val="accent1"/>
           </a:lnRef>
-          <a:fillRef idx="0">
-            <a:schemeClr val="accent1"/>
+          <a:fillRef idx="1">
+            <a:schemeClr val="lt1"/>
           </a:fillRef>
           <a:effectRef idx="0">
             <a:schemeClr val="accent1"/>
           </a:effectRef>
           <a:fontRef idx="minor">
-            <a:schemeClr val="tx1"/>
+            <a:schemeClr val="dk1"/>
           </a:fontRef>
         </p:style>
       </p:cxnSp>
       <p:cxnSp>
         <p:nvCxnSpPr>
-          <p:cNvPr id="85" name="Straight Arrow Connector 84"/>
+          <p:cNvPr id="47" name="Straight Arrow Connector 46"/>
           <p:cNvCxnSpPr>
-            <a:stCxn id="9" idx="2"/>
-            <a:endCxn id="64" idx="0"/>
+            <a:stCxn id="42" idx="2"/>
           </p:cNvCxnSpPr>
           <p:nvPr/>
         </p:nvCxnSpPr>
         <p:spPr>
-          <a:xfrm flipH="1">
-            <a:off x="7776306" y="1660122"/>
-            <a:ext cx="50" cy="904782"/>
+          <a:xfrm>
+            <a:off x="7421010" y="2280290"/>
+            <a:ext cx="0" cy="305926"/>
           </a:xfrm>
           <a:prstGeom prst="straightConnector1">
             <a:avLst/>
@@ -3901,29 +3659,377 @@
           </a:ln>
         </p:spPr>
         <p:style>
-          <a:lnRef idx="1">
+          <a:lnRef idx="2">
             <a:schemeClr val="accent1"/>
           </a:lnRef>
-          <a:fillRef idx="0">
-            <a:schemeClr val="accent1"/>
+          <a:fillRef idx="1">
+            <a:schemeClr val="lt1"/>
           </a:fillRef>
           <a:effectRef idx="0">
             <a:schemeClr val="accent1"/>
           </a:effectRef>
           <a:fontRef idx="minor">
-            <a:schemeClr val="tx1"/>
+            <a:schemeClr val="dk1"/>
           </a:fontRef>
         </p:style>
       </p:cxnSp>
       <p:sp>
         <p:nvSpPr>
-          <p:cNvPr id="88" name="TextBox 87"/>
+          <p:cNvPr id="56" name="Flowchart: Process 55"/>
+          <p:cNvSpPr/>
+          <p:nvPr/>
+        </p:nvSpPr>
+        <p:spPr>
+          <a:xfrm>
+            <a:off x="6695798" y="2597959"/>
+            <a:ext cx="1450424" cy="596408"/>
+          </a:xfrm>
+          <a:prstGeom prst="flowChartProcess">
+            <a:avLst/>
+          </a:prstGeom>
+        </p:spPr>
+        <p:style>
+          <a:lnRef idx="2">
+            <a:schemeClr val="accent1"/>
+          </a:lnRef>
+          <a:fillRef idx="1">
+            <a:schemeClr val="lt1"/>
+          </a:fillRef>
+          <a:effectRef idx="0">
+            <a:schemeClr val="accent1"/>
+          </a:effectRef>
+          <a:fontRef idx="minor">
+            <a:schemeClr val="dk1"/>
+          </a:fontRef>
+        </p:style>
+        <p:txBody>
+          <a:bodyPr rtlCol="0" anchor="ctr"/>
+          <a:lstStyle/>
+          <a:p>
+            <a:pPr algn="ctr"/>
+            <a:endParaRPr lang="da-DK" sz="1200" dirty="0" smtClean="0">
+              <a:solidFill>
+                <a:schemeClr val="tx1"/>
+              </a:solidFill>
+            </a:endParaRPr>
+          </a:p>
+          <a:p>
+            <a:pPr algn="ctr"/>
+            <a:r>
+              <a:rPr lang="da-DK" sz="1200" dirty="0" smtClean="0">
+                <a:solidFill>
+                  <a:schemeClr val="tx1"/>
+                </a:solidFill>
+              </a:rPr>
+              <a:t>Find angle of cloth.</a:t>
+            </a:r>
+            <a:endParaRPr lang="da-DK" sz="1200" dirty="0">
+              <a:solidFill>
+                <a:schemeClr val="tx1"/>
+              </a:solidFill>
+            </a:endParaRPr>
+          </a:p>
+          <a:p>
+            <a:pPr algn="ctr"/>
+            <a:endParaRPr lang="da-DK" sz="1200" dirty="0"/>
+          </a:p>
+        </p:txBody>
+      </p:sp>
+      <p:sp>
+        <p:nvSpPr>
+          <p:cNvPr id="57" name="Flowchart: Process 56"/>
+          <p:cNvSpPr/>
+          <p:nvPr/>
+        </p:nvSpPr>
+        <p:spPr>
+          <a:xfrm>
+            <a:off x="6695798" y="3378304"/>
+            <a:ext cx="1450424" cy="596408"/>
+          </a:xfrm>
+          <a:prstGeom prst="flowChartProcess">
+            <a:avLst/>
+          </a:prstGeom>
+        </p:spPr>
+        <p:style>
+          <a:lnRef idx="2">
+            <a:schemeClr val="accent1"/>
+          </a:lnRef>
+          <a:fillRef idx="1">
+            <a:schemeClr val="lt1"/>
+          </a:fillRef>
+          <a:effectRef idx="0">
+            <a:schemeClr val="accent1"/>
+          </a:effectRef>
+          <a:fontRef idx="minor">
+            <a:schemeClr val="dk1"/>
+          </a:fontRef>
+        </p:style>
+        <p:txBody>
+          <a:bodyPr rtlCol="0" anchor="ctr"/>
+          <a:lstStyle/>
+          <a:p>
+            <a:pPr algn="ctr"/>
+            <a:endParaRPr lang="da-DK" sz="1200" dirty="0" smtClean="0">
+              <a:solidFill>
+                <a:schemeClr val="tx1"/>
+              </a:solidFill>
+            </a:endParaRPr>
+          </a:p>
+          <a:p>
+            <a:pPr algn="ctr"/>
+            <a:r>
+              <a:rPr lang="da-DK" sz="1200" dirty="0" smtClean="0">
+                <a:solidFill>
+                  <a:schemeClr val="tx1"/>
+                </a:solidFill>
+              </a:rPr>
+              <a:t>Save mask, angle and ROI.</a:t>
+            </a:r>
+            <a:endParaRPr lang="da-DK" sz="1200" dirty="0">
+              <a:solidFill>
+                <a:schemeClr val="tx1"/>
+              </a:solidFill>
+            </a:endParaRPr>
+          </a:p>
+          <a:p>
+            <a:pPr algn="ctr"/>
+            <a:endParaRPr lang="da-DK" sz="1200" dirty="0"/>
+          </a:p>
+        </p:txBody>
+      </p:sp>
+      <p:cxnSp>
+        <p:nvCxnSpPr>
+          <p:cNvPr id="49" name="Straight Arrow Connector 48"/>
+          <p:cNvCxnSpPr>
+            <a:stCxn id="56" idx="2"/>
+            <a:endCxn id="57" idx="0"/>
+          </p:cNvCxnSpPr>
+          <p:nvPr/>
+        </p:nvCxnSpPr>
+        <p:spPr>
+          <a:xfrm>
+            <a:off x="7421010" y="3194367"/>
+            <a:ext cx="0" cy="183937"/>
+          </a:xfrm>
+          <a:prstGeom prst="straightConnector1">
+            <a:avLst/>
+          </a:prstGeom>
+          <a:ln>
+            <a:tailEnd type="arrow"/>
+          </a:ln>
+        </p:spPr>
+        <p:style>
+          <a:lnRef idx="2">
+            <a:schemeClr val="accent1"/>
+          </a:lnRef>
+          <a:fillRef idx="1">
+            <a:schemeClr val="lt1"/>
+          </a:fillRef>
+          <a:effectRef idx="0">
+            <a:schemeClr val="accent1"/>
+          </a:effectRef>
+          <a:fontRef idx="minor">
+            <a:schemeClr val="dk1"/>
+          </a:fontRef>
+        </p:style>
+      </p:cxnSp>
+      <p:sp>
+        <p:nvSpPr>
+          <p:cNvPr id="60" name="Flowchart: Process 59"/>
+          <p:cNvSpPr/>
+          <p:nvPr/>
+        </p:nvSpPr>
+        <p:spPr>
+          <a:xfrm>
+            <a:off x="4892427" y="2597959"/>
+            <a:ext cx="1450424" cy="596408"/>
+          </a:xfrm>
+          <a:prstGeom prst="flowChartProcess">
+            <a:avLst/>
+          </a:prstGeom>
+        </p:spPr>
+        <p:style>
+          <a:lnRef idx="2">
+            <a:schemeClr val="accent1"/>
+          </a:lnRef>
+          <a:fillRef idx="1">
+            <a:schemeClr val="lt1"/>
+          </a:fillRef>
+          <a:effectRef idx="0">
+            <a:schemeClr val="accent1"/>
+          </a:effectRef>
+          <a:fontRef idx="minor">
+            <a:schemeClr val="dk1"/>
+          </a:fontRef>
+        </p:style>
+        <p:txBody>
+          <a:bodyPr rtlCol="0" anchor="ctr"/>
+          <a:lstStyle/>
+          <a:p>
+            <a:pPr algn="ctr"/>
+            <a:endParaRPr lang="da-DK" sz="1200" dirty="0" smtClean="0">
+              <a:solidFill>
+                <a:schemeClr val="tx1"/>
+              </a:solidFill>
+            </a:endParaRPr>
+          </a:p>
+          <a:p>
+            <a:pPr algn="ctr"/>
+            <a:r>
+              <a:rPr lang="da-DK" sz="1200" dirty="0" smtClean="0">
+                <a:solidFill>
+                  <a:schemeClr val="tx1"/>
+                </a:solidFill>
+              </a:rPr>
+              <a:t>Find angle of cloth.</a:t>
+            </a:r>
+            <a:endParaRPr lang="da-DK" sz="1200" dirty="0">
+              <a:solidFill>
+                <a:schemeClr val="tx1"/>
+              </a:solidFill>
+            </a:endParaRPr>
+          </a:p>
+          <a:p>
+            <a:pPr algn="ctr"/>
+            <a:endParaRPr lang="da-DK" sz="1200" dirty="0"/>
+          </a:p>
+        </p:txBody>
+      </p:sp>
+      <p:cxnSp>
+        <p:nvCxnSpPr>
+          <p:cNvPr id="51" name="Elbow Connector 50"/>
+          <p:cNvCxnSpPr>
+            <a:stCxn id="42" idx="1"/>
+            <a:endCxn id="60" idx="0"/>
+          </p:cNvCxnSpPr>
+          <p:nvPr/>
+        </p:nvCxnSpPr>
+        <p:spPr>
+          <a:xfrm rot="10800000" flipV="1">
+            <a:off x="5617640" y="2001205"/>
+            <a:ext cx="964083" cy="596754"/>
+          </a:xfrm>
+          <a:prstGeom prst="bentConnector2">
+            <a:avLst/>
+          </a:prstGeom>
+          <a:ln>
+            <a:tailEnd type="arrow"/>
+          </a:ln>
+        </p:spPr>
+        <p:style>
+          <a:lnRef idx="2">
+            <a:schemeClr val="accent1"/>
+          </a:lnRef>
+          <a:fillRef idx="1">
+            <a:schemeClr val="lt1"/>
+          </a:fillRef>
+          <a:effectRef idx="0">
+            <a:schemeClr val="accent1"/>
+          </a:effectRef>
+          <a:fontRef idx="minor">
+            <a:schemeClr val="dk1"/>
+          </a:fontRef>
+        </p:style>
+      </p:cxnSp>
+      <p:sp>
+        <p:nvSpPr>
+          <p:cNvPr id="52" name="Rectangle 51"/>
+          <p:cNvSpPr/>
+          <p:nvPr/>
+        </p:nvSpPr>
+        <p:spPr>
+          <a:xfrm>
+            <a:off x="5967942" y="1724206"/>
+            <a:ext cx="365806" cy="276999"/>
+          </a:xfrm>
+          <a:prstGeom prst="rect">
+            <a:avLst/>
+          </a:prstGeom>
+        </p:spPr>
+        <p:txBody>
+          <a:bodyPr wrap="none">
+            <a:spAutoFit/>
+          </a:bodyPr>
+          <a:lstStyle/>
+          <a:p>
+            <a:r>
+              <a:rPr lang="da-DK" sz="1200" dirty="0"/>
+              <a:t>No</a:t>
+            </a:r>
+          </a:p>
+        </p:txBody>
+      </p:sp>
+      <p:sp>
+        <p:nvSpPr>
+          <p:cNvPr id="53" name="Rectangle 52"/>
+          <p:cNvSpPr/>
+          <p:nvPr/>
+        </p:nvSpPr>
+        <p:spPr>
+          <a:xfrm>
+            <a:off x="7482684" y="2280290"/>
+            <a:ext cx="386837" cy="276999"/>
+          </a:xfrm>
+          <a:prstGeom prst="rect">
+            <a:avLst/>
+          </a:prstGeom>
+        </p:spPr>
+        <p:txBody>
+          <a:bodyPr wrap="none">
+            <a:spAutoFit/>
+          </a:bodyPr>
+          <a:lstStyle/>
+          <a:p>
+            <a:r>
+              <a:rPr lang="da-DK" sz="1200" dirty="0" smtClean="0"/>
+              <a:t>Yes</a:t>
+            </a:r>
+            <a:endParaRPr lang="da-DK" dirty="0"/>
+          </a:p>
+        </p:txBody>
+      </p:sp>
+      <p:cxnSp>
+        <p:nvCxnSpPr>
+          <p:cNvPr id="65" name="Straight Arrow Connector 64"/>
+          <p:cNvCxnSpPr/>
+          <p:nvPr/>
+        </p:nvCxnSpPr>
+        <p:spPr>
+          <a:xfrm>
+            <a:off x="823386" y="307792"/>
+            <a:ext cx="0" cy="432048"/>
+          </a:xfrm>
+          <a:prstGeom prst="straightConnector1">
+            <a:avLst/>
+          </a:prstGeom>
+          <a:ln>
+            <a:tailEnd type="arrow"/>
+          </a:ln>
+        </p:spPr>
+        <p:style>
+          <a:lnRef idx="2">
+            <a:schemeClr val="accent1"/>
+          </a:lnRef>
+          <a:fillRef idx="1">
+            <a:schemeClr val="lt1"/>
+          </a:fillRef>
+          <a:effectRef idx="0">
+            <a:schemeClr val="accent1"/>
+          </a:effectRef>
+          <a:fontRef idx="minor">
+            <a:schemeClr val="dk1"/>
+          </a:fontRef>
+        </p:style>
+      </p:cxnSp>
+      <p:sp>
+        <p:nvSpPr>
+          <p:cNvPr id="66" name="TextBox 65"/>
           <p:cNvSpPr txBox="1"/>
           <p:nvPr/>
         </p:nvSpPr>
         <p:spPr>
           <a:xfrm>
-            <a:off x="1299616" y="276295"/>
+            <a:off x="538158" y="30793"/>
             <a:ext cx="568104" cy="276999"/>
           </a:xfrm>
           <a:prstGeom prst="rect">

</xml_diff>